<commit_message>
Viva ppt edited for LR_whats diff
</commit_message>
<xml_diff>
--- a/Documents/FitNoQuit_Viva PPT.pptx
+++ b/Documents/FitNoQuit_Viva PPT.pptx
@@ -10,7 +10,7 @@
     <p:sldId id="271" r:id="rId4"/>
     <p:sldId id="260" r:id="rId5"/>
     <p:sldId id="259" r:id="rId6"/>
-    <p:sldId id="280" r:id="rId7"/>
+    <p:sldId id="282" r:id="rId7"/>
     <p:sldId id="276" r:id="rId8"/>
     <p:sldId id="263" r:id="rId9"/>
     <p:sldId id="275" r:id="rId10"/>
@@ -7768,12 +7768,48 @@
           <a:chExt cx="0" cy="0"/>
         </a:xfrm>
       </p:grpSpPr>
+      <p:pic>
+        <p:nvPicPr>
+          <p:cNvPr id="6" name="Picture 5" descr="A picture containing drawing&#10;&#10;Description automatically generated">
+            <a:extLst>
+              <a:ext uri="{FF2B5EF4-FFF2-40B4-BE49-F238E27FC236}">
+                <a16:creationId xmlns:a16="http://schemas.microsoft.com/office/drawing/2014/main" id="{DA3B82F8-7F36-4AE6-A785-76BCA479C67E}"/>
+              </a:ext>
+            </a:extLst>
+          </p:cNvPr>
+          <p:cNvPicPr>
+            <a:picLocks noChangeAspect="1"/>
+          </p:cNvPicPr>
+          <p:nvPr/>
+        </p:nvPicPr>
+        <p:blipFill>
+          <a:blip r:embed="rId2" cstate="print">
+            <a:extLst>
+              <a:ext uri="{28A0092B-C50C-407E-A947-70E740481C1C}">
+                <a14:useLocalDpi xmlns:a14="http://schemas.microsoft.com/office/drawing/2010/main" val="0"/>
+              </a:ext>
+            </a:extLst>
+          </a:blip>
+          <a:stretch>
+            <a:fillRect/>
+          </a:stretch>
+        </p:blipFill>
+        <p:spPr>
+          <a:xfrm>
+            <a:off x="567563" y="6188227"/>
+            <a:ext cx="2655568" cy="663892"/>
+          </a:xfrm>
+          <a:prstGeom prst="rect">
+            <a:avLst/>
+          </a:prstGeom>
+        </p:spPr>
+      </p:pic>
       <p:sp>
         <p:nvSpPr>
-          <p:cNvPr id="2" name="Title 1">
+          <p:cNvPr id="13" name="Title 12">
             <a:extLst>
               <a:ext uri="{FF2B5EF4-FFF2-40B4-BE49-F238E27FC236}">
-                <a16:creationId xmlns:a16="http://schemas.microsoft.com/office/drawing/2014/main" id="{50820582-56D3-4B00-9020-7A1509FEE7C0}"/>
+                <a16:creationId xmlns:a16="http://schemas.microsoft.com/office/drawing/2014/main" id="{98058B23-DDE2-4F62-9A2E-46739C3C685F}"/>
               </a:ext>
             </a:extLst>
           </p:cNvPr>
@@ -7784,10 +7820,750 @@
             <p:ph type="title"/>
           </p:nvPr>
         </p:nvSpPr>
-        <p:spPr/>
+        <p:spPr>
+          <a:xfrm>
+            <a:off x="838201" y="-1791478"/>
+            <a:ext cx="10515600" cy="1325563"/>
+          </a:xfrm>
+        </p:spPr>
         <p:txBody>
           <a:bodyPr/>
           <a:lstStyle/>
+          <a:p>
+            <a:br>
+              <a:rPr lang="en-US" sz="3600">
+                <a:latin typeface="Marcellus" panose="020E0602050203020307" pitchFamily="34" charset="0"/>
+              </a:rPr>
+            </a:br>
+            <a:endParaRPr lang="en-US">
+              <a:cs typeface="Calibri Light" panose="020F0302020204030204"/>
+            </a:endParaRPr>
+          </a:p>
+        </p:txBody>
+      </p:sp>
+      <p:graphicFrame>
+        <p:nvGraphicFramePr>
+          <p:cNvPr id="9" name="Content Placeholder 8">
+            <a:extLst>
+              <a:ext uri="{FF2B5EF4-FFF2-40B4-BE49-F238E27FC236}">
+                <a16:creationId xmlns:a16="http://schemas.microsoft.com/office/drawing/2014/main" id="{3DA2148B-2CB2-43DA-B799-B035C9967C39}"/>
+              </a:ext>
+            </a:extLst>
+          </p:cNvPr>
+          <p:cNvGraphicFramePr>
+            <a:graphicFrameLocks noGrp="1"/>
+          </p:cNvGraphicFramePr>
+          <p:nvPr>
+            <p:ph idx="1"/>
+          </p:nvPr>
+        </p:nvGraphicFramePr>
+        <p:xfrm>
+          <a:off x="561580" y="581870"/>
+          <a:ext cx="11505729" cy="6065520"/>
+        </p:xfrm>
+        <a:graphic>
+          <a:graphicData uri="http://schemas.openxmlformats.org/drawingml/2006/table">
+            <a:tbl>
+              <a:tblPr firstRow="1" bandRow="1">
+                <a:tableStyleId>{5C22544A-7EE6-4342-B048-85BDC9FD1C3A}</a:tableStyleId>
+              </a:tblPr>
+              <a:tblGrid>
+                <a:gridCol w="1041492">
+                  <a:extLst>
+                    <a:ext uri="{9D8B030D-6E8A-4147-A177-3AD203B41FA5}">
+                      <a16:colId xmlns:a16="http://schemas.microsoft.com/office/drawing/2014/main" val="106185652"/>
+                    </a:ext>
+                  </a:extLst>
+                </a:gridCol>
+                <a:gridCol w="3024346">
+                  <a:extLst>
+                    <a:ext uri="{9D8B030D-6E8A-4147-A177-3AD203B41FA5}">
+                      <a16:colId xmlns:a16="http://schemas.microsoft.com/office/drawing/2014/main" val="20001"/>
+                    </a:ext>
+                  </a:extLst>
+                </a:gridCol>
+                <a:gridCol w="3075709">
+                  <a:extLst>
+                    <a:ext uri="{9D8B030D-6E8A-4147-A177-3AD203B41FA5}">
+                      <a16:colId xmlns:a16="http://schemas.microsoft.com/office/drawing/2014/main" val="1817510831"/>
+                    </a:ext>
+                  </a:extLst>
+                </a:gridCol>
+                <a:gridCol w="4364182">
+                  <a:extLst>
+                    <a:ext uri="{9D8B030D-6E8A-4147-A177-3AD203B41FA5}">
+                      <a16:colId xmlns:a16="http://schemas.microsoft.com/office/drawing/2014/main" val="917427177"/>
+                    </a:ext>
+                  </a:extLst>
+                </a:gridCol>
+              </a:tblGrid>
+              <a:tr h="540348">
+                <a:tc>
+                  <a:txBody>
+                    <a:bodyPr/>
+                    <a:lstStyle/>
+                    <a:p>
+                      <a:pPr rtl="0" fontAlgn="base"/>
+                      <a:r>
+                        <a:rPr lang="en-US" sz="1600" dirty="0">
+                          <a:effectLst/>
+                        </a:rPr>
+                        <a:t>Existing Systems​</a:t>
+                      </a:r>
+                      <a:endParaRPr lang="en-US" sz="1600" b="1" dirty="0">
+                        <a:effectLst/>
+                      </a:endParaRPr>
+                    </a:p>
+                  </a:txBody>
+                  <a:tcPr>
+                    <a:solidFill>
+                      <a:srgbClr val="C00000"/>
+                    </a:solidFill>
+                  </a:tcPr>
+                </a:tc>
+                <a:tc>
+                  <a:txBody>
+                    <a:bodyPr/>
+                    <a:lstStyle/>
+                    <a:p>
+                      <a:pPr rtl="0" fontAlgn="base"/>
+                      <a:r>
+                        <a:rPr lang="en-US" sz="1600" b="1" dirty="0">
+                          <a:effectLst/>
+                        </a:rPr>
+                        <a:t>Features of the system</a:t>
+                      </a:r>
+                    </a:p>
+                  </a:txBody>
+                  <a:tcPr>
+                    <a:solidFill>
+                      <a:srgbClr val="C00000"/>
+                    </a:solidFill>
+                  </a:tcPr>
+                </a:tc>
+                <a:tc>
+                  <a:txBody>
+                    <a:bodyPr/>
+                    <a:lstStyle/>
+                    <a:p>
+                      <a:pPr rtl="0" fontAlgn="base"/>
+                      <a:r>
+                        <a:rPr lang="en-US" sz="1600" b="1" dirty="0">
+                          <a:effectLst/>
+                        </a:rPr>
+                        <a:t>Potential</a:t>
+                      </a:r>
+                      <a:r>
+                        <a:rPr lang="en-US" sz="1600" b="1" baseline="0" dirty="0">
+                          <a:effectLst/>
+                        </a:rPr>
+                        <a:t> problems with existing systems.</a:t>
+                      </a:r>
+                      <a:endParaRPr lang="en-US" sz="1600" b="1" dirty="0">
+                        <a:effectLst/>
+                      </a:endParaRPr>
+                    </a:p>
+                  </a:txBody>
+                  <a:tcPr>
+                    <a:solidFill>
+                      <a:srgbClr val="C00000"/>
+                    </a:solidFill>
+                  </a:tcPr>
+                </a:tc>
+                <a:tc>
+                  <a:txBody>
+                    <a:bodyPr/>
+                    <a:lstStyle/>
+                    <a:p>
+                      <a:r>
+                        <a:rPr lang="en-IN" sz="1600" dirty="0"/>
+                        <a:t>How</a:t>
+                      </a:r>
+                      <a:r>
+                        <a:rPr lang="en-IN" sz="1600" baseline="0" dirty="0"/>
+                        <a:t> </a:t>
+                      </a:r>
+                      <a:r>
+                        <a:rPr lang="en-IN" sz="1600" baseline="0" dirty="0" err="1"/>
+                        <a:t>FitNoQuit</a:t>
+                      </a:r>
+                      <a:r>
+                        <a:rPr lang="en-IN" sz="1600" baseline="0" dirty="0"/>
+                        <a:t> solves the issue?</a:t>
+                      </a:r>
+                      <a:endParaRPr lang="en-IN" sz="1600" dirty="0"/>
+                    </a:p>
+                  </a:txBody>
+                  <a:tcPr>
+                    <a:solidFill>
+                      <a:srgbClr val="C00000"/>
+                    </a:solidFill>
+                  </a:tcPr>
+                </a:tc>
+                <a:extLst>
+                  <a:ext uri="{0D108BD9-81ED-4DB2-BD59-A6C34878D82A}">
+                    <a16:rowId xmlns:a16="http://schemas.microsoft.com/office/drawing/2014/main" val="1828088283"/>
+                  </a:ext>
+                </a:extLst>
+              </a:tr>
+              <a:tr h="742580">
+                <a:tc>
+                  <a:txBody>
+                    <a:bodyPr/>
+                    <a:lstStyle/>
+                    <a:p>
+                      <a:r>
+                        <a:rPr lang="en-IN" sz="1600" dirty="0" err="1"/>
+                        <a:t>Fittr</a:t>
+                      </a:r>
+                      <a:endParaRPr lang="en-IN" sz="1600" dirty="0"/>
+                    </a:p>
+                  </a:txBody>
+                  <a:tcPr/>
+                </a:tc>
+                <a:tc>
+                  <a:txBody>
+                    <a:bodyPr/>
+                    <a:lstStyle/>
+                    <a:p>
+                      <a:r>
+                        <a:rPr lang="en-US" sz="1600" dirty="0" err="1">
+                          <a:effectLst/>
+                        </a:rPr>
+                        <a:t>Fittr</a:t>
+                      </a:r>
+                      <a:r>
+                        <a:rPr lang="en-US" sz="1600" dirty="0">
+                          <a:effectLst/>
+                        </a:rPr>
+                        <a:t> is a fitness community where</a:t>
+                      </a:r>
+                      <a:r>
+                        <a:rPr lang="en-US" sz="1600" baseline="0" dirty="0">
+                          <a:effectLst/>
+                        </a:rPr>
+                        <a:t> people share, learn and discuss fitness. It provides articles, recipes and nutrition facts to users.</a:t>
+                      </a:r>
+                      <a:endParaRPr lang="en-IN" sz="1600" dirty="0"/>
+                    </a:p>
+                  </a:txBody>
+                  <a:tcPr/>
+                </a:tc>
+                <a:tc>
+                  <a:txBody>
+                    <a:bodyPr/>
+                    <a:lstStyle/>
+                    <a:p>
+                      <a:pPr algn="l" rtl="0" fontAlgn="base"/>
+                      <a:r>
+                        <a:rPr lang="en-US" sz="1600" baseline="0" dirty="0">
+                          <a:effectLst/>
+                        </a:rPr>
+                        <a:t>These articles are just facts and are </a:t>
+                      </a:r>
+                      <a:r>
+                        <a:rPr lang="en-US" sz="1600" b="1" baseline="0" dirty="0">
+                          <a:effectLst/>
+                        </a:rPr>
+                        <a:t>not customized to the user’s needs.</a:t>
+                      </a:r>
+                      <a:endParaRPr lang="en-US" sz="1600" b="1" dirty="0">
+                        <a:effectLst/>
+                      </a:endParaRPr>
+                    </a:p>
+                  </a:txBody>
+                  <a:tcPr/>
+                </a:tc>
+                <a:tc>
+                  <a:txBody>
+                    <a:bodyPr/>
+                    <a:lstStyle/>
+                    <a:p>
+                      <a:r>
+                        <a:rPr lang="en-IN" sz="1600" dirty="0" err="1"/>
+                        <a:t>FitNoQuit</a:t>
+                      </a:r>
+                      <a:r>
+                        <a:rPr lang="en-IN" sz="1600" baseline="0" dirty="0"/>
+                        <a:t> would provide users with</a:t>
+                      </a:r>
+                      <a:r>
+                        <a:rPr lang="en-IN" sz="1600" b="1" baseline="0" dirty="0"/>
+                        <a:t> customized diets and workouts</a:t>
+                      </a:r>
+                      <a:r>
+                        <a:rPr lang="en-IN" sz="1600" baseline="0" dirty="0"/>
+                        <a:t> to reach a certain fitness goal, along with articles on fitness and nutritional facts.</a:t>
+                      </a:r>
+                      <a:endParaRPr lang="en-IN" sz="1600" dirty="0"/>
+                    </a:p>
+                  </a:txBody>
+                  <a:tcPr/>
+                </a:tc>
+                <a:extLst>
+                  <a:ext uri="{0D108BD9-81ED-4DB2-BD59-A6C34878D82A}">
+                    <a16:rowId xmlns:a16="http://schemas.microsoft.com/office/drawing/2014/main" val="1001681582"/>
+                  </a:ext>
+                </a:extLst>
+              </a:tr>
+              <a:tr h="1828794">
+                <a:tc>
+                  <a:txBody>
+                    <a:bodyPr/>
+                    <a:lstStyle/>
+                    <a:p>
+                      <a:r>
+                        <a:rPr lang="en-IN" sz="1600" dirty="0"/>
+                        <a:t>Cure Fit</a:t>
+                      </a:r>
+                    </a:p>
+                  </a:txBody>
+                  <a:tcPr/>
+                </a:tc>
+                <a:tc>
+                  <a:txBody>
+                    <a:bodyPr/>
+                    <a:lstStyle/>
+                    <a:p>
+                      <a:r>
+                        <a:rPr lang="en-US" sz="1600" dirty="0" err="1"/>
+                        <a:t>cure.fit</a:t>
+                      </a:r>
+                      <a:r>
+                        <a:rPr lang="en-US" sz="1600" dirty="0"/>
+                        <a:t> is a health and fitness company offering digital and offline experiences across fitness.</a:t>
+                      </a:r>
+                      <a:r>
+                        <a:rPr lang="en-US" sz="1600" baseline="0" dirty="0"/>
+                        <a:t> They provide </a:t>
+                      </a:r>
+                      <a:r>
+                        <a:rPr lang="en-US" sz="1600" b="0" baseline="0" dirty="0"/>
+                        <a:t>in-class and group workouts with a live trainer.</a:t>
+                      </a:r>
+                      <a:endParaRPr lang="en-IN" sz="1600" b="0" dirty="0"/>
+                    </a:p>
+                  </a:txBody>
+                  <a:tcPr/>
+                </a:tc>
+                <a:tc>
+                  <a:txBody>
+                    <a:bodyPr/>
+                    <a:lstStyle/>
+                    <a:p>
+                      <a:pPr marL="0" indent="0">
+                        <a:buFontTx/>
+                        <a:buNone/>
+                      </a:pPr>
+                      <a:r>
+                        <a:rPr lang="en-US" sz="1600" b="0" baseline="0" dirty="0"/>
+                        <a:t>1. Workout needs to be carried out during the working hours of the trainers </a:t>
+                      </a:r>
+                      <a:r>
+                        <a:rPr lang="en-US" sz="1600" b="1" baseline="0" dirty="0"/>
+                        <a:t>so timings are less flexible.</a:t>
+                      </a:r>
+                    </a:p>
+                    <a:p>
+                      <a:pPr marL="0" indent="0">
+                        <a:buFontTx/>
+                        <a:buNone/>
+                      </a:pPr>
+                      <a:r>
+                        <a:rPr lang="en-US" sz="1600" b="1" baseline="0" dirty="0"/>
+                        <a:t>2. No personalized diet recommendations</a:t>
+                      </a:r>
+                      <a:r>
+                        <a:rPr lang="en-US" sz="1600" baseline="0" dirty="0"/>
+                        <a:t> are provided.</a:t>
+                      </a:r>
+                      <a:endParaRPr lang="en-US" sz="1600" dirty="0"/>
+                    </a:p>
+                    <a:p>
+                      <a:br>
+                        <a:rPr lang="en-US" sz="1600" dirty="0">
+                          <a:effectLst/>
+                        </a:rPr>
+                      </a:br>
+                      <a:endParaRPr lang="en-IN" sz="1600" dirty="0"/>
+                    </a:p>
+                  </a:txBody>
+                  <a:tcPr/>
+                </a:tc>
+                <a:tc>
+                  <a:txBody>
+                    <a:bodyPr/>
+                    <a:lstStyle/>
+                    <a:p>
+                      <a:pPr marL="0" indent="0">
+                        <a:buFontTx/>
+                        <a:buNone/>
+                      </a:pPr>
+                      <a:r>
+                        <a:rPr lang="en-IN" sz="1600" dirty="0"/>
+                        <a:t>1. With </a:t>
+                      </a:r>
+                      <a:r>
+                        <a:rPr lang="en-IN" sz="1600" dirty="0" err="1"/>
+                        <a:t>FitNoQuit</a:t>
+                      </a:r>
+                      <a:r>
+                        <a:rPr lang="en-IN" sz="1600" dirty="0"/>
+                        <a:t> users</a:t>
+                      </a:r>
+                      <a:r>
+                        <a:rPr lang="en-IN" sz="1600" baseline="0" dirty="0"/>
+                        <a:t> get customized workout plan, which they </a:t>
+                      </a:r>
+                      <a:r>
+                        <a:rPr lang="en-IN" sz="1600" b="1" baseline="0" dirty="0"/>
+                        <a:t>can follow at a time convenient to them.</a:t>
+                      </a:r>
+                    </a:p>
+                    <a:p>
+                      <a:pPr marL="0" indent="0">
+                        <a:buFontTx/>
+                        <a:buNone/>
+                      </a:pPr>
+                      <a:r>
+                        <a:rPr lang="en-IN" sz="1600" baseline="0" dirty="0"/>
+                        <a:t>2. </a:t>
+                      </a:r>
+                      <a:r>
+                        <a:rPr lang="en-IN" sz="1600" baseline="0" dirty="0" err="1"/>
+                        <a:t>FitNoQuit</a:t>
+                      </a:r>
+                      <a:r>
+                        <a:rPr lang="en-IN" sz="1600" baseline="0" dirty="0"/>
+                        <a:t> also </a:t>
+                      </a:r>
+                      <a:r>
+                        <a:rPr lang="en-IN" sz="1600" b="1" baseline="0" dirty="0"/>
+                        <a:t>provides customized diet plans </a:t>
+                      </a:r>
+                      <a:r>
+                        <a:rPr lang="en-IN" sz="1600" baseline="0" dirty="0"/>
+                        <a:t>which is one of the most important ingredient to healthy life, becoming a one stop destination to achieve your health goals.</a:t>
+                      </a:r>
+                      <a:endParaRPr lang="en-IN" sz="1600" dirty="0"/>
+                    </a:p>
+                  </a:txBody>
+                  <a:tcPr/>
+                </a:tc>
+                <a:extLst>
+                  <a:ext uri="{0D108BD9-81ED-4DB2-BD59-A6C34878D82A}">
+                    <a16:rowId xmlns:a16="http://schemas.microsoft.com/office/drawing/2014/main" val="924591228"/>
+                  </a:ext>
+                </a:extLst>
+              </a:tr>
+              <a:tr h="512618">
+                <a:tc>
+                  <a:txBody>
+                    <a:bodyPr/>
+                    <a:lstStyle/>
+                    <a:p>
+                      <a:r>
+                        <a:rPr lang="en-IN" sz="1600" dirty="0"/>
+                        <a:t>Google Fit</a:t>
+                      </a:r>
+                    </a:p>
+                  </a:txBody>
+                  <a:tcPr/>
+                </a:tc>
+                <a:tc>
+                  <a:txBody>
+                    <a:bodyPr/>
+                    <a:lstStyle/>
+                    <a:p>
+                      <a:r>
+                        <a:rPr lang="en-US" sz="1600" b="0" i="0" kern="1200" dirty="0">
+                          <a:solidFill>
+                            <a:schemeClr val="dk1"/>
+                          </a:solidFill>
+                          <a:effectLst/>
+                          <a:latin typeface="+mn-lt"/>
+                          <a:ea typeface="+mn-ea"/>
+                          <a:cs typeface="+mn-cs"/>
+                        </a:rPr>
+                        <a:t>Google Fit helps achieve your fitness goals through </a:t>
+                      </a:r>
+                      <a:r>
+                        <a:rPr lang="en-US" sz="1600" b="0" i="0" kern="1200" dirty="0" err="1">
+                          <a:solidFill>
+                            <a:schemeClr val="dk1"/>
+                          </a:solidFill>
+                          <a:effectLst/>
+                          <a:latin typeface="+mn-lt"/>
+                          <a:ea typeface="+mn-ea"/>
+                          <a:cs typeface="+mn-cs"/>
+                        </a:rPr>
+                        <a:t>customised</a:t>
+                      </a:r>
+                      <a:r>
+                        <a:rPr lang="en-US" sz="1600" b="0" i="0" kern="1200" dirty="0">
+                          <a:solidFill>
+                            <a:schemeClr val="dk1"/>
+                          </a:solidFill>
+                          <a:effectLst/>
+                          <a:latin typeface="+mn-lt"/>
+                          <a:ea typeface="+mn-ea"/>
+                          <a:cs typeface="+mn-cs"/>
+                        </a:rPr>
+                        <a:t> coaching and actionable tips based on your health and activity history</a:t>
+                      </a:r>
+                      <a:endParaRPr lang="en-IN" sz="1600" dirty="0"/>
+                    </a:p>
+                  </a:txBody>
+                  <a:tcPr/>
+                </a:tc>
+                <a:tc>
+                  <a:txBody>
+                    <a:bodyPr/>
+                    <a:lstStyle/>
+                    <a:p>
+                      <a:r>
+                        <a:rPr lang="en-IN" sz="1600" dirty="0"/>
+                        <a:t>It is more of an Activity Tracker, </a:t>
+                      </a:r>
+                      <a:r>
+                        <a:rPr lang="en-IN" sz="1600" b="1" dirty="0"/>
+                        <a:t>does not give any recommendations.</a:t>
+                      </a:r>
+                    </a:p>
+                  </a:txBody>
+                  <a:tcPr/>
+                </a:tc>
+                <a:tc>
+                  <a:txBody>
+                    <a:bodyPr/>
+                    <a:lstStyle/>
+                    <a:p>
+                      <a:r>
+                        <a:rPr lang="en-IN" sz="1600" dirty="0" err="1"/>
+                        <a:t>FitNoQuit</a:t>
+                      </a:r>
+                      <a:r>
+                        <a:rPr lang="en-IN" sz="1600" baseline="0" dirty="0"/>
+                        <a:t> would provide users with</a:t>
+                      </a:r>
+                      <a:r>
+                        <a:rPr lang="en-IN" sz="1600" b="1" baseline="0" dirty="0"/>
+                        <a:t> customized diets and workouts</a:t>
+                      </a:r>
+                      <a:r>
+                        <a:rPr lang="en-IN" sz="1600" baseline="0" dirty="0"/>
+                        <a:t> to reach a certain fitness goal, along with articles on fitness and nutritional facts.</a:t>
+                      </a:r>
+                      <a:endParaRPr lang="en-IN" sz="1600" dirty="0"/>
+                    </a:p>
+                  </a:txBody>
+                  <a:tcPr/>
+                </a:tc>
+                <a:extLst>
+                  <a:ext uri="{0D108BD9-81ED-4DB2-BD59-A6C34878D82A}">
+                    <a16:rowId xmlns:a16="http://schemas.microsoft.com/office/drawing/2014/main" val="10003"/>
+                  </a:ext>
+                </a:extLst>
+              </a:tr>
+              <a:tr h="512618">
+                <a:tc>
+                  <a:txBody>
+                    <a:bodyPr/>
+                    <a:lstStyle/>
+                    <a:p>
+                      <a:r>
+                        <a:rPr lang="en-IN" sz="1600" dirty="0" err="1"/>
+                        <a:t>HealthifyMe</a:t>
+                      </a:r>
+                      <a:endParaRPr lang="en-IN" sz="1600" dirty="0"/>
+                    </a:p>
+                  </a:txBody>
+                  <a:tcPr/>
+                </a:tc>
+                <a:tc>
+                  <a:txBody>
+                    <a:bodyPr/>
+                    <a:lstStyle/>
+                    <a:p>
+                      <a:r>
+                        <a:rPr lang="en-IN" sz="1600" dirty="0"/>
+                        <a:t>It is a lifestyle tracker,</a:t>
+                      </a:r>
+                      <a:r>
+                        <a:rPr lang="en-IN" sz="1600" baseline="0" dirty="0"/>
+                        <a:t> which allows you to track your nutrition and plan your diet.</a:t>
+                      </a:r>
+                      <a:endParaRPr lang="en-IN" sz="1600" dirty="0"/>
+                    </a:p>
+                  </a:txBody>
+                  <a:tcPr/>
+                </a:tc>
+                <a:tc>
+                  <a:txBody>
+                    <a:bodyPr/>
+                    <a:lstStyle/>
+                    <a:p>
+                      <a:r>
+                        <a:rPr lang="en-IN" sz="1600" dirty="0" err="1"/>
+                        <a:t>Healthify</a:t>
+                      </a:r>
+                      <a:r>
+                        <a:rPr lang="en-IN" sz="1600" baseline="0" dirty="0"/>
+                        <a:t> me gives users a workout plan for their goals </a:t>
+                      </a:r>
+                      <a:r>
+                        <a:rPr lang="en-IN" sz="1600" b="1" baseline="0" dirty="0"/>
+                        <a:t>but doesn’t give an option to select.</a:t>
+                      </a:r>
+                      <a:endParaRPr lang="en-IN" sz="1600" b="1" dirty="0"/>
+                    </a:p>
+                  </a:txBody>
+                  <a:tcPr/>
+                </a:tc>
+                <a:tc>
+                  <a:txBody>
+                    <a:bodyPr/>
+                    <a:lstStyle/>
+                    <a:p>
+                      <a:r>
+                        <a:rPr lang="en-IN" sz="1600" dirty="0" err="1"/>
+                        <a:t>FitNoQuit</a:t>
+                      </a:r>
+                      <a:r>
+                        <a:rPr lang="en-IN" sz="1600" baseline="0" dirty="0"/>
+                        <a:t> considers that a user might not be able to perform a certain activity thus provides various options to attain the same goal, </a:t>
+                      </a:r>
+                      <a:r>
+                        <a:rPr lang="en-IN" sz="1600" b="1" baseline="0" dirty="0"/>
+                        <a:t>from which the users can select.</a:t>
+                      </a:r>
+                      <a:endParaRPr lang="en-IN" sz="1600" b="1" dirty="0"/>
+                    </a:p>
+                  </a:txBody>
+                  <a:tcPr/>
+                </a:tc>
+                <a:extLst>
+                  <a:ext uri="{0D108BD9-81ED-4DB2-BD59-A6C34878D82A}">
+                    <a16:rowId xmlns:a16="http://schemas.microsoft.com/office/drawing/2014/main" val="10004"/>
+                  </a:ext>
+                </a:extLst>
+              </a:tr>
+            </a:tbl>
+          </a:graphicData>
+        </a:graphic>
+      </p:graphicFrame>
+      <p:pic>
+        <p:nvPicPr>
+          <p:cNvPr id="4" name="Picture 3">
+            <a:extLst>
+              <a:ext uri="{FF2B5EF4-FFF2-40B4-BE49-F238E27FC236}">
+                <a16:creationId xmlns:a16="http://schemas.microsoft.com/office/drawing/2014/main" id="{8026AED6-E793-48A3-96AF-36A0D1FE2D70}"/>
+              </a:ext>
+            </a:extLst>
+          </p:cNvPr>
+          <p:cNvPicPr>
+            <a:picLocks noChangeAspect="1"/>
+          </p:cNvPicPr>
+          <p:nvPr/>
+        </p:nvPicPr>
+        <p:blipFill>
+          <a:blip r:embed="rId3"/>
+          <a:stretch>
+            <a:fillRect/>
+          </a:stretch>
+        </p:blipFill>
+        <p:spPr>
+          <a:xfrm>
+            <a:off x="605" y="2219"/>
+            <a:ext cx="566958" cy="6855781"/>
+          </a:xfrm>
+          <a:prstGeom prst="rect">
+            <a:avLst/>
+          </a:prstGeom>
+        </p:spPr>
+      </p:pic>
+      <p:pic>
+        <p:nvPicPr>
+          <p:cNvPr id="11" name="Picture 10" descr="A close up of a sign&#10;&#10;Description automatically generated">
+            <a:extLst>
+              <a:ext uri="{FF2B5EF4-FFF2-40B4-BE49-F238E27FC236}">
+                <a16:creationId xmlns:a16="http://schemas.microsoft.com/office/drawing/2014/main" id="{C8EA3854-8902-4417-899A-DE9CBF528C1A}"/>
+              </a:ext>
+            </a:extLst>
+          </p:cNvPr>
+          <p:cNvPicPr>
+            <a:picLocks noChangeAspect="1"/>
+          </p:cNvPicPr>
+          <p:nvPr/>
+        </p:nvPicPr>
+        <p:blipFill>
+          <a:blip r:embed="rId4" cstate="print">
+            <a:extLst>
+              <a:ext uri="{28A0092B-C50C-407E-A947-70E740481C1C}">
+                <a14:useLocalDpi xmlns:a14="http://schemas.microsoft.com/office/drawing/2010/main" val="0"/>
+              </a:ext>
+            </a:extLst>
+          </a:blip>
+          <a:stretch>
+            <a:fillRect/>
+          </a:stretch>
+        </p:blipFill>
+        <p:spPr>
+          <a:xfrm>
+            <a:off x="11470388" y="6313693"/>
+            <a:ext cx="722364" cy="538426"/>
+          </a:xfrm>
+          <a:prstGeom prst="rect">
+            <a:avLst/>
+          </a:prstGeom>
+        </p:spPr>
+      </p:pic>
+      <p:sp>
+        <p:nvSpPr>
+          <p:cNvPr id="10" name="Title 12">
+            <a:extLst>
+              <a:ext uri="{FF2B5EF4-FFF2-40B4-BE49-F238E27FC236}">
+                <a16:creationId xmlns:a16="http://schemas.microsoft.com/office/drawing/2014/main" id="{98058B23-DDE2-4F62-9A2E-46739C3C685F}"/>
+              </a:ext>
+            </a:extLst>
+          </p:cNvPr>
+          <p:cNvSpPr txBox="1">
+            <a:spLocks/>
+          </p:cNvSpPr>
+          <p:nvPr/>
+        </p:nvSpPr>
+        <p:spPr>
+          <a:xfrm>
+            <a:off x="954788" y="2219"/>
+            <a:ext cx="10515600" cy="1325563"/>
+          </a:xfrm>
+          <a:prstGeom prst="rect">
+            <a:avLst/>
+          </a:prstGeom>
+        </p:spPr>
+        <p:txBody>
+          <a:bodyPr vert="horz" lIns="91440" tIns="45720" rIns="91440" bIns="45720" rtlCol="0" anchor="ctr">
+            <a:normAutofit/>
+          </a:bodyPr>
+          <a:lstStyle>
+            <a:lvl1pPr algn="l" defTabSz="914400" rtl="0" eaLnBrk="1" latinLnBrk="0" hangingPunct="1">
+              <a:lnSpc>
+                <a:spcPct val="90000"/>
+              </a:lnSpc>
+              <a:spcBef>
+                <a:spcPct val="0"/>
+              </a:spcBef>
+              <a:buNone/>
+              <a:defRPr sz="4400" kern="1200">
+                <a:solidFill>
+                  <a:schemeClr val="tx1"/>
+                </a:solidFill>
+                <a:latin typeface="+mj-lt"/>
+                <a:ea typeface="+mj-ea"/>
+                <a:cs typeface="+mj-cs"/>
+              </a:defRPr>
+            </a:lvl1pPr>
+          </a:lstStyle>
           <a:p>
             <a:r>
               <a:rPr lang="en-US" sz="3600" dirty="0">
@@ -7795,9 +8571,8 @@
                   <a:srgbClr val="FF0000"/>
                 </a:solidFill>
                 <a:latin typeface="Marcellus"/>
-                <a:cs typeface="Calibri Light"/>
               </a:rPr>
-              <a:t>What is Different in </a:t>
+              <a:t>What’s different in </a:t>
             </a:r>
             <a:r>
               <a:rPr lang="en-US" sz="3600" dirty="0" err="1">
@@ -7805,7 +8580,6 @@
                   <a:srgbClr val="FF0000"/>
                 </a:solidFill>
                 <a:latin typeface="Marcellus"/>
-                <a:cs typeface="Calibri Light"/>
               </a:rPr>
               <a:t>FitNoQuit</a:t>
             </a:r>
@@ -7815,115 +8589,16 @@
                   <a:srgbClr val="FF0000"/>
                 </a:solidFill>
                 <a:latin typeface="Marcellus"/>
-                <a:cs typeface="Calibri Light"/>
               </a:rPr>
               <a:t>?</a:t>
             </a:r>
-            <a:endParaRPr lang="en-US" sz="3600" dirty="0">
-              <a:solidFill>
-                <a:srgbClr val="FF0000"/>
-              </a:solidFill>
-              <a:latin typeface="Marcellus"/>
-            </a:endParaRPr>
-          </a:p>
-        </p:txBody>
-      </p:sp>
-      <p:sp>
-        <p:nvSpPr>
-          <p:cNvPr id="3" name="Content Placeholder 2">
-            <a:extLst>
-              <a:ext uri="{FF2B5EF4-FFF2-40B4-BE49-F238E27FC236}">
-                <a16:creationId xmlns:a16="http://schemas.microsoft.com/office/drawing/2014/main" id="{D084D8E5-07F2-441B-8309-6E6940CCC7A2}"/>
-              </a:ext>
-            </a:extLst>
-          </p:cNvPr>
-          <p:cNvSpPr>
-            <a:spLocks noGrp="1"/>
-          </p:cNvSpPr>
-          <p:nvPr>
-            <p:ph idx="1"/>
-          </p:nvPr>
-        </p:nvSpPr>
-        <p:spPr/>
-        <p:txBody>
-          <a:bodyPr vert="horz" lIns="91440" tIns="45720" rIns="91440" bIns="45720" rtlCol="0" anchor="t">
-            <a:normAutofit/>
-          </a:bodyPr>
-          <a:lstStyle/>
-          <a:p>
-            <a:r>
+            <a:br>
               <a:rPr lang="en-US" dirty="0">
-                <a:ea typeface="+mn-lt"/>
-                <a:cs typeface="+mn-lt"/>
+                <a:latin typeface="Marcellus" panose="020E0602050203020307" pitchFamily="34" charset="0"/>
               </a:rPr>
-              <a:t>Our proposed system takes into account both diet and workout recommendations which has not been included in the papers covered in the literature review and existing system like “</a:t>
-            </a:r>
-            <a:r>
-              <a:rPr lang="en-US" dirty="0" err="1">
-                <a:ea typeface="+mn-lt"/>
-                <a:cs typeface="+mn-lt"/>
-              </a:rPr>
-              <a:t>Fittr</a:t>
-            </a:r>
-            <a:r>
-              <a:rPr lang="en-US" dirty="0">
-                <a:ea typeface="+mn-lt"/>
-                <a:cs typeface="+mn-lt"/>
-              </a:rPr>
-              <a:t>”. </a:t>
-            </a:r>
-          </a:p>
-          <a:p>
-            <a:r>
-              <a:rPr lang="en-US" dirty="0">
-                <a:ea typeface="+mn-lt"/>
-                <a:cs typeface="+mn-lt"/>
-              </a:rPr>
-              <a:t> Existing systems like “Cure fit” and “Google fit” don’t give personalized diet recommendations and our web app aims to address this feature and incorporate it. </a:t>
-            </a:r>
-            <a:endParaRPr lang="en-US">
-              <a:ea typeface="+mn-lt"/>
-              <a:cs typeface="+mn-lt"/>
-            </a:endParaRPr>
-          </a:p>
-          <a:p>
-            <a:r>
-              <a:rPr lang="en-US" dirty="0">
-                <a:ea typeface="+mn-lt"/>
-                <a:cs typeface="+mn-lt"/>
-              </a:rPr>
-              <a:t>Workout suggested in present systems like “</a:t>
-            </a:r>
-            <a:r>
-              <a:rPr lang="en-US" dirty="0" err="1">
-                <a:ea typeface="+mn-lt"/>
-                <a:cs typeface="+mn-lt"/>
-              </a:rPr>
-              <a:t>HealthifyMe</a:t>
-            </a:r>
-            <a:r>
-              <a:rPr lang="en-US" dirty="0">
-                <a:ea typeface="+mn-lt"/>
-                <a:cs typeface="+mn-lt"/>
-              </a:rPr>
-              <a:t>” do not take into account the user preferences. </a:t>
-            </a:r>
-            <a:r>
-              <a:rPr lang="en-US" dirty="0" err="1">
-                <a:ea typeface="+mn-lt"/>
-                <a:cs typeface="+mn-lt"/>
-              </a:rPr>
-              <a:t>FitNoQuit</a:t>
-            </a:r>
-            <a:r>
-              <a:rPr lang="en-US" dirty="0">
-                <a:ea typeface="+mn-lt"/>
-                <a:cs typeface="+mn-lt"/>
-              </a:rPr>
-              <a:t> will provide workout options to choose from which gives the user a better experience.</a:t>
-            </a:r>
-            <a:endParaRPr lang="en-US">
-              <a:cs typeface="Calibri"/>
+            </a:br>
+            <a:endParaRPr lang="en-US" dirty="0">
+              <a:cs typeface="Calibri Light" panose="020F0302020204030204"/>
             </a:endParaRPr>
           </a:p>
         </p:txBody>
@@ -7931,7 +8606,7 @@
     </p:spTree>
     <p:extLst>
       <p:ext uri="{BB962C8B-B14F-4D97-AF65-F5344CB8AC3E}">
-        <p14:creationId xmlns:p14="http://schemas.microsoft.com/office/powerpoint/2010/main" val="230399586"/>
+        <p14:creationId xmlns:p14="http://schemas.microsoft.com/office/powerpoint/2010/main" val="2747974961"/>
       </p:ext>
     </p:extLst>
   </p:cSld>

</xml_diff>

<commit_message>
PPT changes for sending maam and Dhwani suggestions added
</commit_message>
<xml_diff>
--- a/Documents/FitNoQuit_Viva PPT.pptx
+++ b/Documents/FitNoQuit_Viva PPT.pptx
@@ -287,7 +287,7 @@
           <a:p>
             <a:fld id="{D8F213FC-66C6-4930-AAD8-6C0E37E6E5CB}" type="datetimeFigureOut">
               <a:rPr lang="en-US" smtClean="0"/>
-              <a:t>12/18/2021</a:t>
+              <a:t>12/25/2021</a:t>
             </a:fld>
             <a:endParaRPr lang="en-US"/>
           </a:p>
@@ -455,7 +455,7 @@
           <a:p>
             <a:fld id="{D8F213FC-66C6-4930-AAD8-6C0E37E6E5CB}" type="datetimeFigureOut">
               <a:rPr lang="en-US" smtClean="0"/>
-              <a:t>12/18/2021</a:t>
+              <a:t>12/25/2021</a:t>
             </a:fld>
             <a:endParaRPr lang="en-US"/>
           </a:p>
@@ -633,7 +633,7 @@
           <a:p>
             <a:fld id="{D8F213FC-66C6-4930-AAD8-6C0E37E6E5CB}" type="datetimeFigureOut">
               <a:rPr lang="en-US" smtClean="0"/>
-              <a:t>12/18/2021</a:t>
+              <a:t>12/25/2021</a:t>
             </a:fld>
             <a:endParaRPr lang="en-US"/>
           </a:p>
@@ -801,7 +801,7 @@
           <a:p>
             <a:fld id="{D8F213FC-66C6-4930-AAD8-6C0E37E6E5CB}" type="datetimeFigureOut">
               <a:rPr lang="en-US" smtClean="0"/>
-              <a:t>12/18/2021</a:t>
+              <a:t>12/25/2021</a:t>
             </a:fld>
             <a:endParaRPr lang="en-US"/>
           </a:p>
@@ -1046,7 +1046,7 @@
           <a:p>
             <a:fld id="{D8F213FC-66C6-4930-AAD8-6C0E37E6E5CB}" type="datetimeFigureOut">
               <a:rPr lang="en-US" smtClean="0"/>
-              <a:t>12/18/2021</a:t>
+              <a:t>12/25/2021</a:t>
             </a:fld>
             <a:endParaRPr lang="en-US"/>
           </a:p>
@@ -1275,7 +1275,7 @@
           <a:p>
             <a:fld id="{D8F213FC-66C6-4930-AAD8-6C0E37E6E5CB}" type="datetimeFigureOut">
               <a:rPr lang="en-US" smtClean="0"/>
-              <a:t>12/18/2021</a:t>
+              <a:t>12/25/2021</a:t>
             </a:fld>
             <a:endParaRPr lang="en-US"/>
           </a:p>
@@ -1639,7 +1639,7 @@
           <a:p>
             <a:fld id="{D8F213FC-66C6-4930-AAD8-6C0E37E6E5CB}" type="datetimeFigureOut">
               <a:rPr lang="en-US" smtClean="0"/>
-              <a:t>12/18/2021</a:t>
+              <a:t>12/25/2021</a:t>
             </a:fld>
             <a:endParaRPr lang="en-US"/>
           </a:p>
@@ -1756,7 +1756,7 @@
           <a:p>
             <a:fld id="{D8F213FC-66C6-4930-AAD8-6C0E37E6E5CB}" type="datetimeFigureOut">
               <a:rPr lang="en-US" smtClean="0"/>
-              <a:t>12/18/2021</a:t>
+              <a:t>12/25/2021</a:t>
             </a:fld>
             <a:endParaRPr lang="en-US"/>
           </a:p>
@@ -1851,7 +1851,7 @@
           <a:p>
             <a:fld id="{D8F213FC-66C6-4930-AAD8-6C0E37E6E5CB}" type="datetimeFigureOut">
               <a:rPr lang="en-US" smtClean="0"/>
-              <a:t>12/18/2021</a:t>
+              <a:t>12/25/2021</a:t>
             </a:fld>
             <a:endParaRPr lang="en-US"/>
           </a:p>
@@ -2126,7 +2126,7 @@
           <a:p>
             <a:fld id="{D8F213FC-66C6-4930-AAD8-6C0E37E6E5CB}" type="datetimeFigureOut">
               <a:rPr lang="en-US" smtClean="0"/>
-              <a:t>12/18/2021</a:t>
+              <a:t>12/25/2021</a:t>
             </a:fld>
             <a:endParaRPr lang="en-US"/>
           </a:p>
@@ -2381,7 +2381,7 @@
           <a:p>
             <a:fld id="{D8F213FC-66C6-4930-AAD8-6C0E37E6E5CB}" type="datetimeFigureOut">
               <a:rPr lang="en-US" smtClean="0"/>
-              <a:t>12/18/2021</a:t>
+              <a:t>12/25/2021</a:t>
             </a:fld>
             <a:endParaRPr lang="en-US"/>
           </a:p>
@@ -2592,7 +2592,7 @@
           <a:p>
             <a:fld id="{D8F213FC-66C6-4930-AAD8-6C0E37E6E5CB}" type="datetimeFigureOut">
               <a:rPr lang="en-US" smtClean="0"/>
-              <a:t>12/18/2021</a:t>
+              <a:t>12/25/2021</a:t>
             </a:fld>
             <a:endParaRPr lang="en-US"/>
           </a:p>
@@ -3002,7 +3002,7 @@
           <p:cNvPr id="13" name="Title 12">
             <a:extLst>
               <a:ext uri="{FF2B5EF4-FFF2-40B4-BE49-F238E27FC236}">
-                <a16:creationId xmlns:a16="http://schemas.microsoft.com/office/drawing/2014/main" xmlns="" id="{98058B23-DDE2-4F62-9A2E-46739C3C685F}"/>
+                <a16:creationId xmlns:a16="http://schemas.microsoft.com/office/drawing/2014/main" id="{98058B23-DDE2-4F62-9A2E-46739C3C685F}"/>
               </a:ext>
             </a:extLst>
           </p:cNvPr>
@@ -3035,12 +3035,6 @@
               </a:rPr>
               <a:t>FitNoQuit</a:t>
             </a:r>
-            <a:r>
-              <a:rPr lang="en-US">
-                <a:latin typeface="Marcellus" panose="020E0602050203020307" pitchFamily="34" charset="0"/>
-              </a:rPr>
-              <a:t/>
-            </a:r>
             <a:br>
               <a:rPr lang="en-US">
                 <a:latin typeface="Marcellus" panose="020E0602050203020307" pitchFamily="34" charset="0"/>
@@ -3057,7 +3051,7 @@
           <p:cNvPr id="3" name="Subtitle 2">
             <a:extLst>
               <a:ext uri="{FF2B5EF4-FFF2-40B4-BE49-F238E27FC236}">
-                <a16:creationId xmlns:a16="http://schemas.microsoft.com/office/drawing/2014/main" xmlns="" id="{6D9CEDE5-3115-42FB-90A3-0727B8EEECC0}"/>
+                <a16:creationId xmlns:a16="http://schemas.microsoft.com/office/drawing/2014/main" id="{6D9CEDE5-3115-42FB-90A3-0727B8EEECC0}"/>
               </a:ext>
             </a:extLst>
           </p:cNvPr>
@@ -3110,7 +3104,7 @@
           <p:cNvPr id="4" name="Picture 3">
             <a:extLst>
               <a:ext uri="{FF2B5EF4-FFF2-40B4-BE49-F238E27FC236}">
-                <a16:creationId xmlns:a16="http://schemas.microsoft.com/office/drawing/2014/main" xmlns="" id="{8026AED6-E793-48A3-96AF-36A0D1FE2D70}"/>
+                <a16:creationId xmlns:a16="http://schemas.microsoft.com/office/drawing/2014/main" id="{8026AED6-E793-48A3-96AF-36A0D1FE2D70}"/>
               </a:ext>
             </a:extLst>
           </p:cNvPr>
@@ -3140,7 +3134,7 @@
           <p:cNvPr id="5" name="Picture 4">
             <a:extLst>
               <a:ext uri="{FF2B5EF4-FFF2-40B4-BE49-F238E27FC236}">
-                <a16:creationId xmlns:a16="http://schemas.microsoft.com/office/drawing/2014/main" xmlns="" id="{98F5ADD7-F579-4B31-B088-24730AEA76C9}"/>
+                <a16:creationId xmlns:a16="http://schemas.microsoft.com/office/drawing/2014/main" id="{98F5ADD7-F579-4B31-B088-24730AEA76C9}"/>
               </a:ext>
             </a:extLst>
           </p:cNvPr>
@@ -3170,7 +3164,7 @@
           <p:cNvPr id="11" name="Picture 10" descr="A close up of a sign&#10;&#10;Description automatically generated">
             <a:extLst>
               <a:ext uri="{FF2B5EF4-FFF2-40B4-BE49-F238E27FC236}">
-                <a16:creationId xmlns:a16="http://schemas.microsoft.com/office/drawing/2014/main" xmlns="" id="{C8EA3854-8902-4417-899A-DE9CBF528C1A}"/>
+                <a16:creationId xmlns:a16="http://schemas.microsoft.com/office/drawing/2014/main" id="{C8EA3854-8902-4417-899A-DE9CBF528C1A}"/>
               </a:ext>
             </a:extLst>
           </p:cNvPr>
@@ -3206,7 +3200,7 @@
           <p:cNvPr id="6" name="Picture 5" descr="A picture containing drawing&#10;&#10;Description automatically generated">
             <a:extLst>
               <a:ext uri="{FF2B5EF4-FFF2-40B4-BE49-F238E27FC236}">
-                <a16:creationId xmlns:a16="http://schemas.microsoft.com/office/drawing/2014/main" xmlns="" id="{DA3B82F8-7F36-4AE6-A785-76BCA479C67E}"/>
+                <a16:creationId xmlns:a16="http://schemas.microsoft.com/office/drawing/2014/main" id="{DA3B82F8-7F36-4AE6-A785-76BCA479C67E}"/>
               </a:ext>
             </a:extLst>
           </p:cNvPr>
@@ -3242,7 +3236,7 @@
           <p:cNvPr id="2" name="TextBox 1">
             <a:extLst>
               <a:ext uri="{FF2B5EF4-FFF2-40B4-BE49-F238E27FC236}">
-                <a16:creationId xmlns:a16="http://schemas.microsoft.com/office/drawing/2014/main" xmlns="" id="{BFEC63CA-336E-43EF-A434-D7E0CB267BBA}"/>
+                <a16:creationId xmlns:a16="http://schemas.microsoft.com/office/drawing/2014/main" id="{BFEC63CA-336E-43EF-A434-D7E0CB267BBA}"/>
               </a:ext>
             </a:extLst>
           </p:cNvPr>
@@ -3481,7 +3475,7 @@
           <p:cNvPr id="13" name="Title 12">
             <a:extLst>
               <a:ext uri="{FF2B5EF4-FFF2-40B4-BE49-F238E27FC236}">
-                <a16:creationId xmlns:a16="http://schemas.microsoft.com/office/drawing/2014/main" xmlns="" id="{98058B23-DDE2-4F62-9A2E-46739C3C685F}"/>
+                <a16:creationId xmlns:a16="http://schemas.microsoft.com/office/drawing/2014/main" id="{98058B23-DDE2-4F62-9A2E-46739C3C685F}"/>
               </a:ext>
             </a:extLst>
           </p:cNvPr>
@@ -3543,7 +3537,7 @@
           <p:cNvPr id="3" name="Subtitle 2">
             <a:extLst>
               <a:ext uri="{FF2B5EF4-FFF2-40B4-BE49-F238E27FC236}">
-                <a16:creationId xmlns:a16="http://schemas.microsoft.com/office/drawing/2014/main" xmlns="" id="{6D9CEDE5-3115-42FB-90A3-0727B8EEECC0}"/>
+                <a16:creationId xmlns:a16="http://schemas.microsoft.com/office/drawing/2014/main" id="{6D9CEDE5-3115-42FB-90A3-0727B8EEECC0}"/>
               </a:ext>
             </a:extLst>
           </p:cNvPr>
@@ -3608,7 +3602,7 @@
           <p:cNvPr id="4" name="Picture 3">
             <a:extLst>
               <a:ext uri="{FF2B5EF4-FFF2-40B4-BE49-F238E27FC236}">
-                <a16:creationId xmlns:a16="http://schemas.microsoft.com/office/drawing/2014/main" xmlns="" id="{8026AED6-E793-48A3-96AF-36A0D1FE2D70}"/>
+                <a16:creationId xmlns:a16="http://schemas.microsoft.com/office/drawing/2014/main" id="{8026AED6-E793-48A3-96AF-36A0D1FE2D70}"/>
               </a:ext>
             </a:extLst>
           </p:cNvPr>
@@ -3638,7 +3632,7 @@
           <p:cNvPr id="5" name="Picture 4">
             <a:extLst>
               <a:ext uri="{FF2B5EF4-FFF2-40B4-BE49-F238E27FC236}">
-                <a16:creationId xmlns:a16="http://schemas.microsoft.com/office/drawing/2014/main" xmlns="" id="{98F5ADD7-F579-4B31-B088-24730AEA76C9}"/>
+                <a16:creationId xmlns:a16="http://schemas.microsoft.com/office/drawing/2014/main" id="{98F5ADD7-F579-4B31-B088-24730AEA76C9}"/>
               </a:ext>
             </a:extLst>
           </p:cNvPr>
@@ -3668,7 +3662,7 @@
           <p:cNvPr id="11" name="Picture 10" descr="A close up of a sign&#10;&#10;Description automatically generated">
             <a:extLst>
               <a:ext uri="{FF2B5EF4-FFF2-40B4-BE49-F238E27FC236}">
-                <a16:creationId xmlns:a16="http://schemas.microsoft.com/office/drawing/2014/main" xmlns="" id="{C8EA3854-8902-4417-899A-DE9CBF528C1A}"/>
+                <a16:creationId xmlns:a16="http://schemas.microsoft.com/office/drawing/2014/main" id="{C8EA3854-8902-4417-899A-DE9CBF528C1A}"/>
               </a:ext>
             </a:extLst>
           </p:cNvPr>
@@ -3704,7 +3698,7 @@
           <p:cNvPr id="6" name="Picture 5" descr="A picture containing drawing&#10;&#10;Description automatically generated">
             <a:extLst>
               <a:ext uri="{FF2B5EF4-FFF2-40B4-BE49-F238E27FC236}">
-                <a16:creationId xmlns:a16="http://schemas.microsoft.com/office/drawing/2014/main" xmlns="" id="{DA3B82F8-7F36-4AE6-A785-76BCA479C67E}"/>
+                <a16:creationId xmlns:a16="http://schemas.microsoft.com/office/drawing/2014/main" id="{DA3B82F8-7F36-4AE6-A785-76BCA479C67E}"/>
               </a:ext>
             </a:extLst>
           </p:cNvPr>
@@ -3740,7 +3734,7 @@
           <p:cNvPr id="2" name="Picture 6" descr="Table&#10;&#10;Description automatically generated">
             <a:extLst>
               <a:ext uri="{FF2B5EF4-FFF2-40B4-BE49-F238E27FC236}">
-                <a16:creationId xmlns:a16="http://schemas.microsoft.com/office/drawing/2014/main" xmlns="" id="{8CC55693-C6C0-4399-9C43-FB417318E1E9}"/>
+                <a16:creationId xmlns:a16="http://schemas.microsoft.com/office/drawing/2014/main" id="{8CC55693-C6C0-4399-9C43-FB417318E1E9}"/>
               </a:ext>
             </a:extLst>
           </p:cNvPr>
@@ -3799,7 +3793,7 @@
           <p:cNvPr id="13" name="Title 12">
             <a:extLst>
               <a:ext uri="{FF2B5EF4-FFF2-40B4-BE49-F238E27FC236}">
-                <a16:creationId xmlns:a16="http://schemas.microsoft.com/office/drawing/2014/main" xmlns="" id="{98058B23-DDE2-4F62-9A2E-46739C3C685F}"/>
+                <a16:creationId xmlns:a16="http://schemas.microsoft.com/office/drawing/2014/main" id="{98058B23-DDE2-4F62-9A2E-46739C3C685F}"/>
               </a:ext>
             </a:extLst>
           </p:cNvPr>
@@ -3820,12 +3814,6 @@
           <a:bodyPr/>
           <a:lstStyle/>
           <a:p>
-            <a:r>
-              <a:rPr lang="en-US" dirty="0">
-                <a:latin typeface="Marcellus" panose="020E0602050203020307" pitchFamily="34" charset="0"/>
-              </a:rPr>
-              <a:t/>
-            </a:r>
             <a:br>
               <a:rPr lang="en-US" dirty="0">
                 <a:latin typeface="Marcellus" panose="020E0602050203020307" pitchFamily="34" charset="0"/>
@@ -3842,7 +3830,7 @@
           <p:cNvPr id="3" name="Subtitle 2">
             <a:extLst>
               <a:ext uri="{FF2B5EF4-FFF2-40B4-BE49-F238E27FC236}">
-                <a16:creationId xmlns:a16="http://schemas.microsoft.com/office/drawing/2014/main" xmlns="" id="{6D9CEDE5-3115-42FB-90A3-0727B8EEECC0}"/>
+                <a16:creationId xmlns:a16="http://schemas.microsoft.com/office/drawing/2014/main" id="{6D9CEDE5-3115-42FB-90A3-0727B8EEECC0}"/>
               </a:ext>
             </a:extLst>
           </p:cNvPr>
@@ -3893,7 +3881,7 @@
           <p:cNvPr id="4" name="Picture 3">
             <a:extLst>
               <a:ext uri="{FF2B5EF4-FFF2-40B4-BE49-F238E27FC236}">
-                <a16:creationId xmlns:a16="http://schemas.microsoft.com/office/drawing/2014/main" xmlns="" id="{8026AED6-E793-48A3-96AF-36A0D1FE2D70}"/>
+                <a16:creationId xmlns:a16="http://schemas.microsoft.com/office/drawing/2014/main" id="{8026AED6-E793-48A3-96AF-36A0D1FE2D70}"/>
               </a:ext>
             </a:extLst>
           </p:cNvPr>
@@ -3923,7 +3911,7 @@
           <p:cNvPr id="5" name="Picture 4">
             <a:extLst>
               <a:ext uri="{FF2B5EF4-FFF2-40B4-BE49-F238E27FC236}">
-                <a16:creationId xmlns:a16="http://schemas.microsoft.com/office/drawing/2014/main" xmlns="" id="{98F5ADD7-F579-4B31-B088-24730AEA76C9}"/>
+                <a16:creationId xmlns:a16="http://schemas.microsoft.com/office/drawing/2014/main" id="{98F5ADD7-F579-4B31-B088-24730AEA76C9}"/>
               </a:ext>
             </a:extLst>
           </p:cNvPr>
@@ -3953,7 +3941,7 @@
           <p:cNvPr id="11" name="Picture 10" descr="A close up of a sign&#10;&#10;Description automatically generated">
             <a:extLst>
               <a:ext uri="{FF2B5EF4-FFF2-40B4-BE49-F238E27FC236}">
-                <a16:creationId xmlns:a16="http://schemas.microsoft.com/office/drawing/2014/main" xmlns="" id="{C8EA3854-8902-4417-899A-DE9CBF528C1A}"/>
+                <a16:creationId xmlns:a16="http://schemas.microsoft.com/office/drawing/2014/main" id="{C8EA3854-8902-4417-899A-DE9CBF528C1A}"/>
               </a:ext>
             </a:extLst>
           </p:cNvPr>
@@ -3989,7 +3977,7 @@
           <p:cNvPr id="6" name="Picture 5" descr="A picture containing drawing&#10;&#10;Description automatically generated">
             <a:extLst>
               <a:ext uri="{FF2B5EF4-FFF2-40B4-BE49-F238E27FC236}">
-                <a16:creationId xmlns:a16="http://schemas.microsoft.com/office/drawing/2014/main" xmlns="" id="{DA3B82F8-7F36-4AE6-A785-76BCA479C67E}"/>
+                <a16:creationId xmlns:a16="http://schemas.microsoft.com/office/drawing/2014/main" id="{DA3B82F8-7F36-4AE6-A785-76BCA479C67E}"/>
               </a:ext>
             </a:extLst>
           </p:cNvPr>
@@ -4025,7 +4013,7 @@
           <p:cNvPr id="2" name="TextBox 1">
             <a:extLst>
               <a:ext uri="{FF2B5EF4-FFF2-40B4-BE49-F238E27FC236}">
-                <a16:creationId xmlns:a16="http://schemas.microsoft.com/office/drawing/2014/main" xmlns="" id="{74C8FBA2-77DC-4463-B7E2-0ABC8F44D513}"/>
+                <a16:creationId xmlns:a16="http://schemas.microsoft.com/office/drawing/2014/main" id="{74C8FBA2-77DC-4463-B7E2-0ABC8F44D513}"/>
               </a:ext>
             </a:extLst>
           </p:cNvPr>
@@ -4075,7 +4063,7 @@
           <p:cNvPr id="8" name="TextBox 7">
             <a:extLst>
               <a:ext uri="{FF2B5EF4-FFF2-40B4-BE49-F238E27FC236}">
-                <a16:creationId xmlns:a16="http://schemas.microsoft.com/office/drawing/2014/main" xmlns="" id="{581A9D07-7449-4E03-A8E7-1E655F1AB3A5}"/>
+                <a16:creationId xmlns:a16="http://schemas.microsoft.com/office/drawing/2014/main" id="{581A9D07-7449-4E03-A8E7-1E655F1AB3A5}"/>
               </a:ext>
             </a:extLst>
           </p:cNvPr>
@@ -4220,7 +4208,7 @@
           <p:cNvPr id="9" name="TextBox 8">
             <a:extLst>
               <a:ext uri="{FF2B5EF4-FFF2-40B4-BE49-F238E27FC236}">
-                <a16:creationId xmlns:a16="http://schemas.microsoft.com/office/drawing/2014/main" xmlns="" id="{EE02221A-A156-4EEA-8A25-C2C07639B057}"/>
+                <a16:creationId xmlns:a16="http://schemas.microsoft.com/office/drawing/2014/main" id="{EE02221A-A156-4EEA-8A25-C2C07639B057}"/>
               </a:ext>
             </a:extLst>
           </p:cNvPr>
@@ -4348,7 +4336,7 @@
           <p:cNvPr id="13" name="Title 12">
             <a:extLst>
               <a:ext uri="{FF2B5EF4-FFF2-40B4-BE49-F238E27FC236}">
-                <a16:creationId xmlns:a16="http://schemas.microsoft.com/office/drawing/2014/main" xmlns="" id="{98058B23-DDE2-4F62-9A2E-46739C3C685F}"/>
+                <a16:creationId xmlns:a16="http://schemas.microsoft.com/office/drawing/2014/main" id="{98058B23-DDE2-4F62-9A2E-46739C3C685F}"/>
               </a:ext>
             </a:extLst>
           </p:cNvPr>
@@ -4378,12 +4366,6 @@
               </a:rPr>
               <a:t>Implementation Details</a:t>
             </a:r>
-            <a:r>
-              <a:rPr lang="en-US" dirty="0">
-                <a:latin typeface="Marcellus" panose="020E0602050203020307" pitchFamily="34" charset="0"/>
-              </a:rPr>
-              <a:t/>
-            </a:r>
             <a:br>
               <a:rPr lang="en-US" dirty="0">
                 <a:latin typeface="Marcellus" panose="020E0602050203020307" pitchFamily="34" charset="0"/>
@@ -4400,7 +4382,7 @@
           <p:cNvPr id="3" name="Subtitle 2">
             <a:extLst>
               <a:ext uri="{FF2B5EF4-FFF2-40B4-BE49-F238E27FC236}">
-                <a16:creationId xmlns:a16="http://schemas.microsoft.com/office/drawing/2014/main" xmlns="" id="{6D9CEDE5-3115-42FB-90A3-0727B8EEECC0}"/>
+                <a16:creationId xmlns:a16="http://schemas.microsoft.com/office/drawing/2014/main" id="{6D9CEDE5-3115-42FB-90A3-0727B8EEECC0}"/>
               </a:ext>
             </a:extLst>
           </p:cNvPr>
@@ -4509,7 +4491,7 @@
                 <a:hlinkClick r:id="rId2">
                   <a:extLst>
                     <a:ext uri="{A12FA001-AC4F-418D-AE19-62706E023703}">
-                      <ahyp:hlinkClr xmlns:ahyp="http://schemas.microsoft.com/office/drawing/2018/hyperlinkcolor" xmlns="" val="tx"/>
+                      <ahyp:hlinkClr xmlns:ahyp="http://schemas.microsoft.com/office/drawing/2018/hyperlinkcolor" val="tx"/>
                     </a:ext>
                   </a:extLst>
                 </a:hlinkClick>
@@ -4614,7 +4596,7 @@
           <p:cNvPr id="4" name="Picture 3">
             <a:extLst>
               <a:ext uri="{FF2B5EF4-FFF2-40B4-BE49-F238E27FC236}">
-                <a16:creationId xmlns:a16="http://schemas.microsoft.com/office/drawing/2014/main" xmlns="" id="{8026AED6-E793-48A3-96AF-36A0D1FE2D70}"/>
+                <a16:creationId xmlns:a16="http://schemas.microsoft.com/office/drawing/2014/main" id="{8026AED6-E793-48A3-96AF-36A0D1FE2D70}"/>
               </a:ext>
             </a:extLst>
           </p:cNvPr>
@@ -4644,7 +4626,7 @@
           <p:cNvPr id="5" name="Picture 4">
             <a:extLst>
               <a:ext uri="{FF2B5EF4-FFF2-40B4-BE49-F238E27FC236}">
-                <a16:creationId xmlns:a16="http://schemas.microsoft.com/office/drawing/2014/main" xmlns="" id="{98F5ADD7-F579-4B31-B088-24730AEA76C9}"/>
+                <a16:creationId xmlns:a16="http://schemas.microsoft.com/office/drawing/2014/main" id="{98F5ADD7-F579-4B31-B088-24730AEA76C9}"/>
               </a:ext>
             </a:extLst>
           </p:cNvPr>
@@ -4674,7 +4656,7 @@
           <p:cNvPr id="11" name="Picture 10" descr="A close up of a sign&#10;&#10;Description automatically generated">
             <a:extLst>
               <a:ext uri="{FF2B5EF4-FFF2-40B4-BE49-F238E27FC236}">
-                <a16:creationId xmlns:a16="http://schemas.microsoft.com/office/drawing/2014/main" xmlns="" id="{C8EA3854-8902-4417-899A-DE9CBF528C1A}"/>
+                <a16:creationId xmlns:a16="http://schemas.microsoft.com/office/drawing/2014/main" id="{C8EA3854-8902-4417-899A-DE9CBF528C1A}"/>
               </a:ext>
             </a:extLst>
           </p:cNvPr>
@@ -4710,7 +4692,7 @@
           <p:cNvPr id="6" name="Picture 5" descr="A picture containing drawing&#10;&#10;Description automatically generated">
             <a:extLst>
               <a:ext uri="{FF2B5EF4-FFF2-40B4-BE49-F238E27FC236}">
-                <a16:creationId xmlns:a16="http://schemas.microsoft.com/office/drawing/2014/main" xmlns="" id="{DA3B82F8-7F36-4AE6-A785-76BCA479C67E}"/>
+                <a16:creationId xmlns:a16="http://schemas.microsoft.com/office/drawing/2014/main" id="{DA3B82F8-7F36-4AE6-A785-76BCA479C67E}"/>
               </a:ext>
             </a:extLst>
           </p:cNvPr>
@@ -4751,14 +4733,6 @@
   <p:clrMapOvr>
     <a:masterClrMapping/>
   </p:clrMapOvr>
-  <mc:AlternateContent xmlns:mc="http://schemas.openxmlformats.org/markup-compatibility/2006">
-    <mc:Choice xmlns:p14="http://schemas.microsoft.com/office/powerpoint/2010/main" Requires="p14">
-      <p:transition spd="slow" p14:dur="2000"/>
-    </mc:Choice>
-    <mc:Fallback>
-      <p:transition spd="slow"/>
-    </mc:Fallback>
-  </mc:AlternateContent>
 </p:sld>
 </file>
 
@@ -4814,7 +4788,7 @@
           <p:cNvPr id="13" name="Title 12">
             <a:extLst>
               <a:ext uri="{FF2B5EF4-FFF2-40B4-BE49-F238E27FC236}">
-                <a16:creationId xmlns:a16="http://schemas.microsoft.com/office/drawing/2014/main" xmlns="" id="{98058B23-DDE2-4F62-9A2E-46739C3C685F}"/>
+                <a16:creationId xmlns:a16="http://schemas.microsoft.com/office/drawing/2014/main" id="{98058B23-DDE2-4F62-9A2E-46739C3C685F}"/>
               </a:ext>
             </a:extLst>
           </p:cNvPr>
@@ -4844,12 +4818,6 @@
               </a:rPr>
               <a:t>Implementation Details</a:t>
             </a:r>
-            <a:r>
-              <a:rPr lang="en-US" dirty="0">
-                <a:latin typeface="Marcellus" panose="020E0602050203020307" pitchFamily="34" charset="0"/>
-              </a:rPr>
-              <a:t/>
-            </a:r>
             <a:br>
               <a:rPr lang="en-US" dirty="0">
                 <a:latin typeface="Marcellus" panose="020E0602050203020307" pitchFamily="34" charset="0"/>
@@ -4866,7 +4834,7 @@
           <p:cNvPr id="4" name="Picture 3">
             <a:extLst>
               <a:ext uri="{FF2B5EF4-FFF2-40B4-BE49-F238E27FC236}">
-                <a16:creationId xmlns:a16="http://schemas.microsoft.com/office/drawing/2014/main" xmlns="" id="{8026AED6-E793-48A3-96AF-36A0D1FE2D70}"/>
+                <a16:creationId xmlns:a16="http://schemas.microsoft.com/office/drawing/2014/main" id="{8026AED6-E793-48A3-96AF-36A0D1FE2D70}"/>
               </a:ext>
             </a:extLst>
           </p:cNvPr>
@@ -4896,7 +4864,7 @@
           <p:cNvPr id="5" name="Picture 4">
             <a:extLst>
               <a:ext uri="{FF2B5EF4-FFF2-40B4-BE49-F238E27FC236}">
-                <a16:creationId xmlns:a16="http://schemas.microsoft.com/office/drawing/2014/main" xmlns="" id="{98F5ADD7-F579-4B31-B088-24730AEA76C9}"/>
+                <a16:creationId xmlns:a16="http://schemas.microsoft.com/office/drawing/2014/main" id="{98F5ADD7-F579-4B31-B088-24730AEA76C9}"/>
               </a:ext>
             </a:extLst>
           </p:cNvPr>
@@ -4926,7 +4894,7 @@
           <p:cNvPr id="11" name="Picture 10" descr="A close up of a sign&#10;&#10;Description automatically generated">
             <a:extLst>
               <a:ext uri="{FF2B5EF4-FFF2-40B4-BE49-F238E27FC236}">
-                <a16:creationId xmlns:a16="http://schemas.microsoft.com/office/drawing/2014/main" xmlns="" id="{C8EA3854-8902-4417-899A-DE9CBF528C1A}"/>
+                <a16:creationId xmlns:a16="http://schemas.microsoft.com/office/drawing/2014/main" id="{C8EA3854-8902-4417-899A-DE9CBF528C1A}"/>
               </a:ext>
             </a:extLst>
           </p:cNvPr>
@@ -4962,7 +4930,7 @@
           <p:cNvPr id="6" name="Picture 5" descr="A picture containing drawing&#10;&#10;Description automatically generated">
             <a:extLst>
               <a:ext uri="{FF2B5EF4-FFF2-40B4-BE49-F238E27FC236}">
-                <a16:creationId xmlns:a16="http://schemas.microsoft.com/office/drawing/2014/main" xmlns="" id="{DA3B82F8-7F36-4AE6-A785-76BCA479C67E}"/>
+                <a16:creationId xmlns:a16="http://schemas.microsoft.com/office/drawing/2014/main" id="{DA3B82F8-7F36-4AE6-A785-76BCA479C67E}"/>
               </a:ext>
             </a:extLst>
           </p:cNvPr>
@@ -5003,14 +4971,6 @@
   <p:clrMapOvr>
     <a:masterClrMapping/>
   </p:clrMapOvr>
-  <mc:AlternateContent xmlns:mc="http://schemas.openxmlformats.org/markup-compatibility/2006">
-    <mc:Choice xmlns:p14="http://schemas.microsoft.com/office/powerpoint/2010/main" Requires="p14">
-      <p:transition spd="slow" p14:dur="2000"/>
-    </mc:Choice>
-    <mc:Fallback>
-      <p:transition spd="slow"/>
-    </mc:Fallback>
-  </mc:AlternateContent>
 </p:sld>
 </file>
 
@@ -5036,7 +4996,7 @@
           <p:cNvPr id="13" name="Title 12">
             <a:extLst>
               <a:ext uri="{FF2B5EF4-FFF2-40B4-BE49-F238E27FC236}">
-                <a16:creationId xmlns:a16="http://schemas.microsoft.com/office/drawing/2014/main" xmlns="" id="{98058B23-DDE2-4F62-9A2E-46739C3C685F}"/>
+                <a16:creationId xmlns:a16="http://schemas.microsoft.com/office/drawing/2014/main" id="{98058B23-DDE2-4F62-9A2E-46739C3C685F}"/>
               </a:ext>
             </a:extLst>
           </p:cNvPr>
@@ -5049,8 +5009,8 @@
         </p:nvSpPr>
         <p:spPr>
           <a:xfrm>
-            <a:off x="953219" y="149465"/>
-            <a:ext cx="10515600" cy="1325563"/>
+            <a:off x="953219" y="149466"/>
+            <a:ext cx="9142503" cy="811588"/>
           </a:xfrm>
         </p:spPr>
         <p:txBody>
@@ -5072,18 +5032,7 @@
               </a:rPr>
               <a:t> </a:t>
             </a:r>
-            <a:r>
-              <a:rPr lang="en-US" dirty="0">
-                <a:latin typeface="Marcellus" panose="020E0602050203020307" pitchFamily="34" charset="0"/>
-              </a:rPr>
-              <a:t/>
-            </a:r>
-            <a:br>
-              <a:rPr lang="en-US" dirty="0">
-                <a:latin typeface="Marcellus" panose="020E0602050203020307" pitchFamily="34" charset="0"/>
-              </a:rPr>
-            </a:br>
-            <a:endParaRPr lang="en-US">
+            <a:endParaRPr lang="en-US" dirty="0">
               <a:cs typeface="Calibri Light" panose="020F0302020204030204"/>
             </a:endParaRPr>
           </a:p>
@@ -5094,7 +5043,7 @@
           <p:cNvPr id="3" name="Subtitle 2">
             <a:extLst>
               <a:ext uri="{FF2B5EF4-FFF2-40B4-BE49-F238E27FC236}">
-                <a16:creationId xmlns:a16="http://schemas.microsoft.com/office/drawing/2014/main" xmlns="" id="{6D9CEDE5-3115-42FB-90A3-0727B8EEECC0}"/>
+                <a16:creationId xmlns:a16="http://schemas.microsoft.com/office/drawing/2014/main" id="{6D9CEDE5-3115-42FB-90A3-0727B8EEECC0}"/>
               </a:ext>
             </a:extLst>
           </p:cNvPr>
@@ -5151,7 +5100,7 @@
           <p:cNvPr id="4" name="Picture 3">
             <a:extLst>
               <a:ext uri="{FF2B5EF4-FFF2-40B4-BE49-F238E27FC236}">
-                <a16:creationId xmlns:a16="http://schemas.microsoft.com/office/drawing/2014/main" xmlns="" id="{8026AED6-E793-48A3-96AF-36A0D1FE2D70}"/>
+                <a16:creationId xmlns:a16="http://schemas.microsoft.com/office/drawing/2014/main" id="{8026AED6-E793-48A3-96AF-36A0D1FE2D70}"/>
               </a:ext>
             </a:extLst>
           </p:cNvPr>
@@ -5181,7 +5130,7 @@
           <p:cNvPr id="5" name="Picture 4">
             <a:extLst>
               <a:ext uri="{FF2B5EF4-FFF2-40B4-BE49-F238E27FC236}">
-                <a16:creationId xmlns:a16="http://schemas.microsoft.com/office/drawing/2014/main" xmlns="" id="{98F5ADD7-F579-4B31-B088-24730AEA76C9}"/>
+                <a16:creationId xmlns:a16="http://schemas.microsoft.com/office/drawing/2014/main" id="{98F5ADD7-F579-4B31-B088-24730AEA76C9}"/>
               </a:ext>
             </a:extLst>
           </p:cNvPr>
@@ -5211,7 +5160,7 @@
           <p:cNvPr id="11" name="Picture 10" descr="A close up of a sign&#10;&#10;Description automatically generated">
             <a:extLst>
               <a:ext uri="{FF2B5EF4-FFF2-40B4-BE49-F238E27FC236}">
-                <a16:creationId xmlns:a16="http://schemas.microsoft.com/office/drawing/2014/main" xmlns="" id="{C8EA3854-8902-4417-899A-DE9CBF528C1A}"/>
+                <a16:creationId xmlns:a16="http://schemas.microsoft.com/office/drawing/2014/main" id="{C8EA3854-8902-4417-899A-DE9CBF528C1A}"/>
               </a:ext>
             </a:extLst>
           </p:cNvPr>
@@ -5247,7 +5196,7 @@
           <p:cNvPr id="6" name="Picture 5" descr="A picture containing drawing&#10;&#10;Description automatically generated">
             <a:extLst>
               <a:ext uri="{FF2B5EF4-FFF2-40B4-BE49-F238E27FC236}">
-                <a16:creationId xmlns:a16="http://schemas.microsoft.com/office/drawing/2014/main" xmlns="" id="{DA3B82F8-7F36-4AE6-A785-76BCA479C67E}"/>
+                <a16:creationId xmlns:a16="http://schemas.microsoft.com/office/drawing/2014/main" id="{DA3B82F8-7F36-4AE6-A785-76BCA479C67E}"/>
               </a:ext>
             </a:extLst>
           </p:cNvPr>
@@ -5283,7 +5232,7 @@
           <p:cNvPr id="2" name="Picture 4" descr="A picture containing text, plaque&#10;&#10;Description automatically generated">
             <a:extLst>
               <a:ext uri="{FF2B5EF4-FFF2-40B4-BE49-F238E27FC236}">
-                <a16:creationId xmlns:a16="http://schemas.microsoft.com/office/drawing/2014/main" xmlns="" id="{D879076F-B3BB-4B69-85F5-799CF4ACF388}"/>
+                <a16:creationId xmlns:a16="http://schemas.microsoft.com/office/drawing/2014/main" id="{D879076F-B3BB-4B69-85F5-799CF4ACF388}"/>
               </a:ext>
             </a:extLst>
           </p:cNvPr>
@@ -5292,16 +5241,15 @@
           </p:cNvPicPr>
           <p:nvPr/>
         </p:nvPicPr>
-        <p:blipFill>
+        <p:blipFill rotWithShape="1">
           <a:blip r:embed="rId6"/>
-          <a:stretch>
-            <a:fillRect/>
-          </a:stretch>
+          <a:srcRect b="56797"/>
+          <a:stretch/>
         </p:blipFill>
         <p:spPr>
           <a:xfrm>
-            <a:off x="4074922" y="1020105"/>
-            <a:ext cx="3837437" cy="4528305"/>
+            <a:off x="1134521" y="2844748"/>
+            <a:ext cx="5910091" cy="3013018"/>
           </a:xfrm>
           <a:prstGeom prst="rect">
             <a:avLst/>
@@ -5310,10 +5258,10 @@
       </p:pic>
       <p:sp>
         <p:nvSpPr>
-          <p:cNvPr id="7" name="TextBox 6">
+          <p:cNvPr id="8" name="TextBox 7">
             <a:extLst>
               <a:ext uri="{FF2B5EF4-FFF2-40B4-BE49-F238E27FC236}">
-                <a16:creationId xmlns:a16="http://schemas.microsoft.com/office/drawing/2014/main" xmlns="" id="{F3C992E4-4412-40CC-A3AD-A0CF0645F3BE}"/>
+                <a16:creationId xmlns:a16="http://schemas.microsoft.com/office/drawing/2014/main" id="{4B3066DB-A874-466C-9F9B-7EB9BDAD993E}"/>
               </a:ext>
             </a:extLst>
           </p:cNvPr>
@@ -5322,8 +5270,8 @@
         </p:nvSpPr>
         <p:spPr>
           <a:xfrm>
-            <a:off x="5343272" y="5576285"/>
-            <a:ext cx="1735494" cy="523220"/>
+            <a:off x="1134521" y="961054"/>
+            <a:ext cx="10388785" cy="1754326"/>
           </a:xfrm>
           <a:prstGeom prst="rect">
             <a:avLst/>
@@ -5336,13 +5284,124 @@
           </a:bodyPr>
           <a:lstStyle/>
           <a:p>
-            <a:r>
-              <a:rPr lang="en-US" sz="2800" dirty="0">
-                <a:hlinkClick r:id="rId7" action="ppaction://hlinkfile"/>
-              </a:rPr>
-              <a:t>Accuracy</a:t>
-            </a:r>
-            <a:endParaRPr lang="en-IN" sz="2800" dirty="0"/>
+            <a:pPr marL="285750" indent="-285750">
+              <a:buFont typeface="Arial" panose="020B0604020202020204" pitchFamily="34" charset="0"/>
+              <a:buChar char="•"/>
+            </a:pPr>
+            <a:r>
+              <a:rPr lang="en-US" dirty="0"/>
+              <a:t>Lets say user’s end goal is to Lose weight. Then based on the information entered by the user, the system calculates the amount of calories the user needs to consume in a day.</a:t>
+            </a:r>
+          </a:p>
+          <a:p>
+            <a:pPr marL="285750" indent="-285750">
+              <a:buFont typeface="Arial" panose="020B0604020202020204" pitchFamily="34" charset="0"/>
+              <a:buChar char="•"/>
+            </a:pPr>
+            <a:r>
+              <a:rPr lang="en-US" dirty="0"/>
+              <a:t>Let total calorie intake be = 1500</a:t>
+            </a:r>
+          </a:p>
+          <a:p>
+            <a:pPr marL="285750" indent="-285750">
+              <a:buFont typeface="Arial" panose="020B0604020202020204" pitchFamily="34" charset="0"/>
+              <a:buChar char="•"/>
+            </a:pPr>
+            <a:r>
+              <a:rPr lang="en-US" dirty="0"/>
+              <a:t>The system would then suggest a diet with total calorie value of 1700, for example.</a:t>
+            </a:r>
+          </a:p>
+          <a:p>
+            <a:pPr marL="285750" indent="-285750">
+              <a:buFont typeface="Arial" panose="020B0604020202020204" pitchFamily="34" charset="0"/>
+              <a:buChar char="•"/>
+            </a:pPr>
+            <a:r>
+              <a:rPr lang="en-US" dirty="0"/>
+              <a:t>Based on this workout would be suggested to lose 200 calories and reach the final calorie count.</a:t>
+            </a:r>
+          </a:p>
+          <a:p>
+            <a:pPr marL="285750" indent="-285750">
+              <a:buFont typeface="Arial" panose="020B0604020202020204" pitchFamily="34" charset="0"/>
+              <a:buChar char="•"/>
+            </a:pPr>
+            <a:r>
+              <a:rPr lang="en-US" dirty="0"/>
+              <a:t>Below are a list of exercises with time duration that user should do to lose those 200 calories.</a:t>
+            </a:r>
+            <a:endParaRPr lang="en-IN" dirty="0"/>
+          </a:p>
+        </p:txBody>
+      </p:sp>
+      <p:sp>
+        <p:nvSpPr>
+          <p:cNvPr id="9" name="TextBox 8">
+            <a:extLst>
+              <a:ext uri="{FF2B5EF4-FFF2-40B4-BE49-F238E27FC236}">
+                <a16:creationId xmlns:a16="http://schemas.microsoft.com/office/drawing/2014/main" id="{E1DCCCFB-82E2-4B61-B391-7875EBFFDA04}"/>
+              </a:ext>
+            </a:extLst>
+          </p:cNvPr>
+          <p:cNvSpPr txBox="1"/>
+          <p:nvPr/>
+        </p:nvSpPr>
+        <p:spPr>
+          <a:xfrm>
+            <a:off x="7231224" y="3032449"/>
+            <a:ext cx="4393213" cy="2031325"/>
+          </a:xfrm>
+          <a:prstGeom prst="rect">
+            <a:avLst/>
+          </a:prstGeom>
+          <a:noFill/>
+        </p:spPr>
+        <p:txBody>
+          <a:bodyPr wrap="square" rtlCol="0">
+            <a:spAutoFit/>
+          </a:bodyPr>
+          <a:lstStyle/>
+          <a:p>
+            <a:pPr marL="285750" indent="-285750">
+              <a:buFont typeface="Arial" panose="020B0604020202020204" pitchFamily="34" charset="0"/>
+              <a:buChar char="•"/>
+            </a:pPr>
+            <a:r>
+              <a:rPr lang="en-US" dirty="0"/>
+              <a:t>1 -&gt; 60 mins (1 hour) of workout</a:t>
+            </a:r>
+          </a:p>
+          <a:p>
+            <a:pPr marL="285750" indent="-285750">
+              <a:buFont typeface="Arial" panose="020B0604020202020204" pitchFamily="34" charset="0"/>
+              <a:buChar char="•"/>
+            </a:pPr>
+            <a:r>
+              <a:rPr lang="en-US" dirty="0"/>
+              <a:t>0.75 -&gt; 45 mins of given workout</a:t>
+            </a:r>
+          </a:p>
+          <a:p>
+            <a:pPr marL="285750" indent="-285750">
+              <a:buFont typeface="Arial" panose="020B0604020202020204" pitchFamily="34" charset="0"/>
+              <a:buChar char="•"/>
+            </a:pPr>
+            <a:r>
+              <a:rPr lang="en-US" dirty="0"/>
+              <a:t>0.5 -&gt; 30 mins of given workout</a:t>
+            </a:r>
+          </a:p>
+          <a:p>
+            <a:endParaRPr lang="en-US" dirty="0"/>
+          </a:p>
+          <a:p>
+            <a:r>
+              <a:rPr lang="en-US" dirty="0"/>
+              <a:t>A 20% calorie buffer is considered to suggest the exercises. Hence, workout burning calories between 180 to 220 are suggested.</a:t>
+            </a:r>
+            <a:endParaRPr lang="en-IN" dirty="0"/>
           </a:p>
         </p:txBody>
       </p:sp>
@@ -5381,7 +5440,7 @@
           <p:cNvPr id="13" name="Title 12">
             <a:extLst>
               <a:ext uri="{FF2B5EF4-FFF2-40B4-BE49-F238E27FC236}">
-                <a16:creationId xmlns:a16="http://schemas.microsoft.com/office/drawing/2014/main" xmlns="" id="{98058B23-DDE2-4F62-9A2E-46739C3C685F}"/>
+                <a16:creationId xmlns:a16="http://schemas.microsoft.com/office/drawing/2014/main" id="{98058B23-DDE2-4F62-9A2E-46739C3C685F}"/>
               </a:ext>
             </a:extLst>
           </p:cNvPr>
@@ -5443,7 +5502,7 @@
           <p:cNvPr id="3" name="Subtitle 2">
             <a:extLst>
               <a:ext uri="{FF2B5EF4-FFF2-40B4-BE49-F238E27FC236}">
-                <a16:creationId xmlns:a16="http://schemas.microsoft.com/office/drawing/2014/main" xmlns="" id="{6D9CEDE5-3115-42FB-90A3-0727B8EEECC0}"/>
+                <a16:creationId xmlns:a16="http://schemas.microsoft.com/office/drawing/2014/main" id="{6D9CEDE5-3115-42FB-90A3-0727B8EEECC0}"/>
               </a:ext>
             </a:extLst>
           </p:cNvPr>
@@ -5626,7 +5685,7 @@
           <p:cNvPr id="4" name="Picture 3">
             <a:extLst>
               <a:ext uri="{FF2B5EF4-FFF2-40B4-BE49-F238E27FC236}">
-                <a16:creationId xmlns:a16="http://schemas.microsoft.com/office/drawing/2014/main" xmlns="" id="{8026AED6-E793-48A3-96AF-36A0D1FE2D70}"/>
+                <a16:creationId xmlns:a16="http://schemas.microsoft.com/office/drawing/2014/main" id="{8026AED6-E793-48A3-96AF-36A0D1FE2D70}"/>
               </a:ext>
             </a:extLst>
           </p:cNvPr>
@@ -5656,7 +5715,7 @@
           <p:cNvPr id="5" name="Picture 4">
             <a:extLst>
               <a:ext uri="{FF2B5EF4-FFF2-40B4-BE49-F238E27FC236}">
-                <a16:creationId xmlns:a16="http://schemas.microsoft.com/office/drawing/2014/main" xmlns="" id="{98F5ADD7-F579-4B31-B088-24730AEA76C9}"/>
+                <a16:creationId xmlns:a16="http://schemas.microsoft.com/office/drawing/2014/main" id="{98F5ADD7-F579-4B31-B088-24730AEA76C9}"/>
               </a:ext>
             </a:extLst>
           </p:cNvPr>
@@ -5686,7 +5745,7 @@
           <p:cNvPr id="11" name="Picture 10" descr="A close up of a sign&#10;&#10;Description automatically generated">
             <a:extLst>
               <a:ext uri="{FF2B5EF4-FFF2-40B4-BE49-F238E27FC236}">
-                <a16:creationId xmlns:a16="http://schemas.microsoft.com/office/drawing/2014/main" xmlns="" id="{C8EA3854-8902-4417-899A-DE9CBF528C1A}"/>
+                <a16:creationId xmlns:a16="http://schemas.microsoft.com/office/drawing/2014/main" id="{C8EA3854-8902-4417-899A-DE9CBF528C1A}"/>
               </a:ext>
             </a:extLst>
           </p:cNvPr>
@@ -5722,7 +5781,7 @@
           <p:cNvPr id="6" name="Picture 5" descr="A picture containing drawing&#10;&#10;Description automatically generated">
             <a:extLst>
               <a:ext uri="{FF2B5EF4-FFF2-40B4-BE49-F238E27FC236}">
-                <a16:creationId xmlns:a16="http://schemas.microsoft.com/office/drawing/2014/main" xmlns="" id="{DA3B82F8-7F36-4AE6-A785-76BCA479C67E}"/>
+                <a16:creationId xmlns:a16="http://schemas.microsoft.com/office/drawing/2014/main" id="{DA3B82F8-7F36-4AE6-A785-76BCA479C67E}"/>
               </a:ext>
             </a:extLst>
           </p:cNvPr>
@@ -5788,7 +5847,7 @@
           <p:cNvPr id="13" name="Title 12">
             <a:extLst>
               <a:ext uri="{FF2B5EF4-FFF2-40B4-BE49-F238E27FC236}">
-                <a16:creationId xmlns:a16="http://schemas.microsoft.com/office/drawing/2014/main" xmlns="" id="{98058B23-DDE2-4F62-9A2E-46739C3C685F}"/>
+                <a16:creationId xmlns:a16="http://schemas.microsoft.com/office/drawing/2014/main" id="{98058B23-DDE2-4F62-9A2E-46739C3C685F}"/>
               </a:ext>
             </a:extLst>
           </p:cNvPr>
@@ -5818,12 +5877,6 @@
               </a:rPr>
               <a:t>References</a:t>
             </a:r>
-            <a:r>
-              <a:rPr lang="en-US">
-                <a:latin typeface="Marcellus" panose="020E0602050203020307" pitchFamily="34" charset="0"/>
-              </a:rPr>
-              <a:t/>
-            </a:r>
             <a:br>
               <a:rPr lang="en-US">
                 <a:latin typeface="Marcellus" panose="020E0602050203020307" pitchFamily="34" charset="0"/>
@@ -5840,7 +5893,7 @@
           <p:cNvPr id="3" name="Subtitle 2">
             <a:extLst>
               <a:ext uri="{FF2B5EF4-FFF2-40B4-BE49-F238E27FC236}">
-                <a16:creationId xmlns:a16="http://schemas.microsoft.com/office/drawing/2014/main" xmlns="" id="{6D9CEDE5-3115-42FB-90A3-0727B8EEECC0}"/>
+                <a16:creationId xmlns:a16="http://schemas.microsoft.com/office/drawing/2014/main" id="{6D9CEDE5-3115-42FB-90A3-0727B8EEECC0}"/>
               </a:ext>
             </a:extLst>
           </p:cNvPr>
@@ -5977,7 +6030,7 @@
           <p:cNvPr id="4" name="Picture 3">
             <a:extLst>
               <a:ext uri="{FF2B5EF4-FFF2-40B4-BE49-F238E27FC236}">
-                <a16:creationId xmlns:a16="http://schemas.microsoft.com/office/drawing/2014/main" xmlns="" id="{8026AED6-E793-48A3-96AF-36A0D1FE2D70}"/>
+                <a16:creationId xmlns:a16="http://schemas.microsoft.com/office/drawing/2014/main" id="{8026AED6-E793-48A3-96AF-36A0D1FE2D70}"/>
               </a:ext>
             </a:extLst>
           </p:cNvPr>
@@ -6007,7 +6060,7 @@
           <p:cNvPr id="5" name="Picture 4">
             <a:extLst>
               <a:ext uri="{FF2B5EF4-FFF2-40B4-BE49-F238E27FC236}">
-                <a16:creationId xmlns:a16="http://schemas.microsoft.com/office/drawing/2014/main" xmlns="" id="{98F5ADD7-F579-4B31-B088-24730AEA76C9}"/>
+                <a16:creationId xmlns:a16="http://schemas.microsoft.com/office/drawing/2014/main" id="{98F5ADD7-F579-4B31-B088-24730AEA76C9}"/>
               </a:ext>
             </a:extLst>
           </p:cNvPr>
@@ -6037,7 +6090,7 @@
           <p:cNvPr id="11" name="Picture 10" descr="A close up of a sign&#10;&#10;Description automatically generated">
             <a:extLst>
               <a:ext uri="{FF2B5EF4-FFF2-40B4-BE49-F238E27FC236}">
-                <a16:creationId xmlns:a16="http://schemas.microsoft.com/office/drawing/2014/main" xmlns="" id="{C8EA3854-8902-4417-899A-DE9CBF528C1A}"/>
+                <a16:creationId xmlns:a16="http://schemas.microsoft.com/office/drawing/2014/main" id="{C8EA3854-8902-4417-899A-DE9CBF528C1A}"/>
               </a:ext>
             </a:extLst>
           </p:cNvPr>
@@ -6073,7 +6126,7 @@
           <p:cNvPr id="6" name="Picture 5" descr="A picture containing drawing&#10;&#10;Description automatically generated">
             <a:extLst>
               <a:ext uri="{FF2B5EF4-FFF2-40B4-BE49-F238E27FC236}">
-                <a16:creationId xmlns:a16="http://schemas.microsoft.com/office/drawing/2014/main" xmlns="" id="{DA3B82F8-7F36-4AE6-A785-76BCA479C67E}"/>
+                <a16:creationId xmlns:a16="http://schemas.microsoft.com/office/drawing/2014/main" id="{DA3B82F8-7F36-4AE6-A785-76BCA479C67E}"/>
               </a:ext>
             </a:extLst>
           </p:cNvPr>
@@ -6139,7 +6192,7 @@
           <p:cNvPr id="13" name="Title 12">
             <a:extLst>
               <a:ext uri="{FF2B5EF4-FFF2-40B4-BE49-F238E27FC236}">
-                <a16:creationId xmlns:a16="http://schemas.microsoft.com/office/drawing/2014/main" xmlns="" id="{98058B23-DDE2-4F62-9A2E-46739C3C685F}"/>
+                <a16:creationId xmlns:a16="http://schemas.microsoft.com/office/drawing/2014/main" id="{98058B23-DDE2-4F62-9A2E-46739C3C685F}"/>
               </a:ext>
             </a:extLst>
           </p:cNvPr>
@@ -6169,12 +6222,6 @@
               </a:rPr>
               <a:t>Problem Statement</a:t>
             </a:r>
-            <a:r>
-              <a:rPr lang="en-US">
-                <a:latin typeface="Marcellus" panose="020E0602050203020307" pitchFamily="34" charset="0"/>
-              </a:rPr>
-              <a:t/>
-            </a:r>
             <a:br>
               <a:rPr lang="en-US">
                 <a:latin typeface="Marcellus" panose="020E0602050203020307" pitchFamily="34" charset="0"/>
@@ -6191,7 +6238,7 @@
           <p:cNvPr id="3" name="Subtitle 2">
             <a:extLst>
               <a:ext uri="{FF2B5EF4-FFF2-40B4-BE49-F238E27FC236}">
-                <a16:creationId xmlns:a16="http://schemas.microsoft.com/office/drawing/2014/main" xmlns="" id="{6D9CEDE5-3115-42FB-90A3-0727B8EEECC0}"/>
+                <a16:creationId xmlns:a16="http://schemas.microsoft.com/office/drawing/2014/main" id="{6D9CEDE5-3115-42FB-90A3-0727B8EEECC0}"/>
               </a:ext>
             </a:extLst>
           </p:cNvPr>
@@ -6310,7 +6357,7 @@
           <p:cNvPr id="4" name="Picture 3">
             <a:extLst>
               <a:ext uri="{FF2B5EF4-FFF2-40B4-BE49-F238E27FC236}">
-                <a16:creationId xmlns:a16="http://schemas.microsoft.com/office/drawing/2014/main" xmlns="" id="{8026AED6-E793-48A3-96AF-36A0D1FE2D70}"/>
+                <a16:creationId xmlns:a16="http://schemas.microsoft.com/office/drawing/2014/main" id="{8026AED6-E793-48A3-96AF-36A0D1FE2D70}"/>
               </a:ext>
             </a:extLst>
           </p:cNvPr>
@@ -6340,7 +6387,7 @@
           <p:cNvPr id="5" name="Picture 4">
             <a:extLst>
               <a:ext uri="{FF2B5EF4-FFF2-40B4-BE49-F238E27FC236}">
-                <a16:creationId xmlns:a16="http://schemas.microsoft.com/office/drawing/2014/main" xmlns="" id="{98F5ADD7-F579-4B31-B088-24730AEA76C9}"/>
+                <a16:creationId xmlns:a16="http://schemas.microsoft.com/office/drawing/2014/main" id="{98F5ADD7-F579-4B31-B088-24730AEA76C9}"/>
               </a:ext>
             </a:extLst>
           </p:cNvPr>
@@ -6370,7 +6417,7 @@
           <p:cNvPr id="11" name="Picture 10" descr="A close up of a sign&#10;&#10;Description automatically generated">
             <a:extLst>
               <a:ext uri="{FF2B5EF4-FFF2-40B4-BE49-F238E27FC236}">
-                <a16:creationId xmlns:a16="http://schemas.microsoft.com/office/drawing/2014/main" xmlns="" id="{C8EA3854-8902-4417-899A-DE9CBF528C1A}"/>
+                <a16:creationId xmlns:a16="http://schemas.microsoft.com/office/drawing/2014/main" id="{C8EA3854-8902-4417-899A-DE9CBF528C1A}"/>
               </a:ext>
             </a:extLst>
           </p:cNvPr>
@@ -6406,7 +6453,7 @@
           <p:cNvPr id="6" name="Picture 5" descr="A picture containing drawing&#10;&#10;Description automatically generated">
             <a:extLst>
               <a:ext uri="{FF2B5EF4-FFF2-40B4-BE49-F238E27FC236}">
-                <a16:creationId xmlns:a16="http://schemas.microsoft.com/office/drawing/2014/main" xmlns="" id="{DA3B82F8-7F36-4AE6-A785-76BCA479C67E}"/>
+                <a16:creationId xmlns:a16="http://schemas.microsoft.com/office/drawing/2014/main" id="{DA3B82F8-7F36-4AE6-A785-76BCA479C67E}"/>
               </a:ext>
             </a:extLst>
           </p:cNvPr>
@@ -6480,7 +6527,7 @@
           <p:cNvPr id="13" name="Title 12">
             <a:extLst>
               <a:ext uri="{FF2B5EF4-FFF2-40B4-BE49-F238E27FC236}">
-                <a16:creationId xmlns:a16="http://schemas.microsoft.com/office/drawing/2014/main" xmlns="" id="{98058B23-DDE2-4F62-9A2E-46739C3C685F}"/>
+                <a16:creationId xmlns:a16="http://schemas.microsoft.com/office/drawing/2014/main" id="{98058B23-DDE2-4F62-9A2E-46739C3C685F}"/>
               </a:ext>
             </a:extLst>
           </p:cNvPr>
@@ -6501,12 +6548,6 @@
           <a:bodyPr/>
           <a:lstStyle/>
           <a:p>
-            <a:r>
-              <a:rPr lang="en-US" sz="3600">
-                <a:latin typeface="Marcellus" panose="020E0602050203020307" pitchFamily="34" charset="0"/>
-              </a:rPr>
-              <a:t/>
-            </a:r>
             <a:br>
               <a:rPr lang="en-US" sz="3600">
                 <a:latin typeface="Marcellus" panose="020E0602050203020307" pitchFamily="34" charset="0"/>
@@ -6523,7 +6564,7 @@
           <p:cNvPr id="9" name="Content Placeholder 8">
             <a:extLst>
               <a:ext uri="{FF2B5EF4-FFF2-40B4-BE49-F238E27FC236}">
-                <a16:creationId xmlns:a16="http://schemas.microsoft.com/office/drawing/2014/main" xmlns="" id="{3DA2148B-2CB2-43DA-B799-B035C9967C39}"/>
+                <a16:creationId xmlns:a16="http://schemas.microsoft.com/office/drawing/2014/main" id="{3DA2148B-2CB2-43DA-B799-B035C9967C39}"/>
               </a:ext>
             </a:extLst>
           </p:cNvPr>
@@ -6534,14 +6575,14 @@
             <p:ph idx="1"/>
             <p:extLst>
               <p:ext uri="{D42A27DB-BD31-4B8C-83A1-F6EECF244321}">
-                <p14:modId xmlns:p14="http://schemas.microsoft.com/office/powerpoint/2010/main" val="6077828"/>
+                <p14:modId xmlns:p14="http://schemas.microsoft.com/office/powerpoint/2010/main" val="2920171412"/>
               </p:ext>
             </p:extLst>
           </p:nvPr>
         </p:nvGraphicFramePr>
         <p:xfrm>
           <a:off x="560716" y="1193321"/>
-          <a:ext cx="11612909" cy="4846320"/>
+          <a:ext cx="11612910" cy="5394960"/>
         </p:xfrm>
         <a:graphic>
           <a:graphicData uri="http://schemas.openxmlformats.org/drawingml/2006/table">
@@ -6550,31 +6591,38 @@
                 <a:tableStyleId>{5C22544A-7EE6-4342-B048-85BDC9FD1C3A}</a:tableStyleId>
               </a:tblPr>
               <a:tblGrid>
-                <a:gridCol w="543382">
+                <a:gridCol w="577619">
                   <a:extLst>
                     <a:ext uri="{9D8B030D-6E8A-4147-A177-3AD203B41FA5}">
-                      <a16:colId xmlns:a16="http://schemas.microsoft.com/office/drawing/2014/main" xmlns="" val="3925268655"/>
+                      <a16:colId xmlns:a16="http://schemas.microsoft.com/office/drawing/2014/main" val="3925268655"/>
                     </a:ext>
                   </a:extLst>
                 </a:gridCol>
-                <a:gridCol w="1672980">
+                <a:gridCol w="1726163">
                   <a:extLst>
                     <a:ext uri="{9D8B030D-6E8A-4147-A177-3AD203B41FA5}">
-                      <a16:colId xmlns:a16="http://schemas.microsoft.com/office/drawing/2014/main" xmlns="" val="106185652"/>
+                      <a16:colId xmlns:a16="http://schemas.microsoft.com/office/drawing/2014/main" val="106185652"/>
                     </a:ext>
                   </a:extLst>
                 </a:gridCol>
-                <a:gridCol w="3403771">
+                <a:gridCol w="3293706">
                   <a:extLst>
                     <a:ext uri="{9D8B030D-6E8A-4147-A177-3AD203B41FA5}">
-                      <a16:colId xmlns:a16="http://schemas.microsoft.com/office/drawing/2014/main" xmlns="" val="1817510831"/>
+                      <a16:colId xmlns:a16="http://schemas.microsoft.com/office/drawing/2014/main" val="1817510831"/>
                     </a:ext>
                   </a:extLst>
                 </a:gridCol>
-                <a:gridCol w="5992776">
+                <a:gridCol w="3051110">
                   <a:extLst>
                     <a:ext uri="{9D8B030D-6E8A-4147-A177-3AD203B41FA5}">
-                      <a16:colId xmlns:a16="http://schemas.microsoft.com/office/drawing/2014/main" xmlns="" val="917427177"/>
+                      <a16:colId xmlns:a16="http://schemas.microsoft.com/office/drawing/2014/main" val="917427177"/>
+                    </a:ext>
+                  </a:extLst>
+                </a:gridCol>
+                <a:gridCol w="2964312">
+                  <a:extLst>
+                    <a:ext uri="{9D8B030D-6E8A-4147-A177-3AD203B41FA5}">
+                      <a16:colId xmlns:a16="http://schemas.microsoft.com/office/drawing/2014/main" val="2221450407"/>
                     </a:ext>
                   </a:extLst>
                 </a:gridCol>
@@ -6660,12 +6708,12 @@
                     <a:p>
                       <a:pPr rtl="0" fontAlgn="base"/>
                       <a:r>
-                        <a:rPr lang="en-US">
+                        <a:rPr lang="en-US" dirty="0">
                           <a:effectLst/>
                         </a:rPr>
                         <a:t>Conclusion​</a:t>
                       </a:r>
-                      <a:endParaRPr lang="en-US" b="1">
+                      <a:endParaRPr lang="en-US" b="1" dirty="0">
                         <a:effectLst/>
                       </a:endParaRPr>
                     </a:p>
@@ -6676,9 +6724,29 @@
                     </a:solidFill>
                   </a:tcPr>
                 </a:tc>
+                <a:tc>
+                  <a:txBody>
+                    <a:bodyPr/>
+                    <a:lstStyle/>
+                    <a:p>
+                      <a:pPr rtl="0" fontAlgn="base"/>
+                      <a:r>
+                        <a:rPr lang="en-US" b="1" dirty="0">
+                          <a:effectLst/>
+                        </a:rPr>
+                        <a:t>Disadvantages</a:t>
+                      </a:r>
+                    </a:p>
+                  </a:txBody>
+                  <a:tcPr>
+                    <a:solidFill>
+                      <a:srgbClr val="C00000"/>
+                    </a:solidFill>
+                  </a:tcPr>
+                </a:tc>
                 <a:extLst>
                   <a:ext uri="{0D108BD9-81ED-4DB2-BD59-A6C34878D82A}">
-                    <a16:rowId xmlns:a16="http://schemas.microsoft.com/office/drawing/2014/main" xmlns="" val="1828088283"/>
+                    <a16:rowId xmlns:a16="http://schemas.microsoft.com/office/drawing/2014/main" val="1828088283"/>
                   </a:ext>
                 </a:extLst>
               </a:tr>
@@ -6712,13 +6780,13 @@
                     <a:p>
                       <a:pPr algn="l" rtl="0" fontAlgn="base"/>
                       <a:r>
-                        <a:rPr lang="en-US">
+                        <a:rPr lang="en-US" dirty="0">
                           <a:effectLst/>
                         </a:rPr>
-                        <a:t>A </a:t>
+                        <a:t>An </a:t>
                       </a:r>
                       <a:r>
-                        <a:rPr lang="en-US" sz="1800" b="0" i="0" u="none" strike="noStrike" noProof="0">
+                        <a:rPr lang="en-US" sz="1800" b="0" i="0" u="none" strike="noStrike" noProof="0" dirty="0">
                           <a:solidFill>
                             <a:schemeClr val="tx1"/>
                           </a:solidFill>
@@ -6727,7 +6795,7 @@
                         </a:rPr>
                         <a:t>e-Health Monitoring System with Diet and Fitness Recommendation using Machine Learning [1]</a:t>
                       </a:r>
-                      <a:endParaRPr lang="en-US" sz="1800" b="1" i="0" u="none" strike="noStrike" noProof="0">
+                      <a:endParaRPr lang="en-US" sz="1800" b="1" i="0" u="none" strike="noStrike" noProof="0" dirty="0">
                         <a:effectLst/>
                         <a:latin typeface="Calibri"/>
                       </a:endParaRPr>
@@ -6737,12 +6805,12 @@
                         <a:buNone/>
                       </a:pPr>
                       <a:r>
-                        <a:rPr lang="en-US">
+                        <a:rPr lang="en-US" dirty="0">
                           <a:effectLst/>
                         </a:rPr>
                         <a:t>​</a:t>
                       </a:r>
-                      <a:endParaRPr lang="en-US">
+                      <a:endParaRPr lang="en-US" dirty="0">
                         <a:solidFill>
                           <a:srgbClr val="000000"/>
                         </a:solidFill>
@@ -6813,7 +6881,7 @@
                         <a:buNone/>
                       </a:pPr>
                       <a:r>
-                        <a:rPr lang="en-US" sz="1800" b="0" i="0" u="none" strike="noStrike" noProof="0">
+                        <a:rPr lang="en-US" sz="1800" b="0" i="0" u="none" strike="noStrike" noProof="0" dirty="0">
                           <a:solidFill>
                             <a:schemeClr val="tx1"/>
                           </a:solidFill>
@@ -6822,7 +6890,7 @@
                         </a:rPr>
                         <a:t>The paper deals with health monitoring of disease like Diabetes, Blood Pressure, and Thyroid based on the patient’s latest report looking for improvements in every follow-up session and recommending suitable and updated diet and exercise plan in each follow-up session based on the reports and other credentials like height, weight, age, activity level, using the Machine Learning technique i.e. C4.5 decision tree algorithm.  </a:t>
                       </a:r>
-                      <a:endParaRPr lang="en-US" sz="1800" b="1" i="0" u="none" strike="noStrike" noProof="0">
+                      <a:endParaRPr lang="en-US" sz="1800" b="1" i="0" u="none" strike="noStrike" noProof="0" dirty="0">
                         <a:effectLst/>
                         <a:latin typeface="Calibri"/>
                       </a:endParaRPr>
@@ -6831,16 +6899,34 @@
                       <a:pPr lvl="0" algn="l">
                         <a:buNone/>
                       </a:pPr>
-                      <a:endParaRPr lang="en-US">
+                      <a:endParaRPr lang="en-US" dirty="0">
                         <a:effectLst/>
                       </a:endParaRPr>
                     </a:p>
                   </a:txBody>
                   <a:tcPr/>
                 </a:tc>
+                <a:tc>
+                  <a:txBody>
+                    <a:bodyPr/>
+                    <a:lstStyle/>
+                    <a:p>
+                      <a:pPr lvl="0" algn="l">
+                        <a:buNone/>
+                      </a:pPr>
+                      <a:r>
+                        <a:rPr lang="en-US" dirty="0">
+                          <a:effectLst/>
+                        </a:rPr>
+                        <a:t>The system suggests diet and workout by taking into account parameters and values related to diseases only. Not suitable for other sets of users (No disease).</a:t>
+                      </a:r>
+                    </a:p>
+                  </a:txBody>
+                  <a:tcPr/>
+                </a:tc>
                 <a:extLst>
                   <a:ext uri="{0D108BD9-81ED-4DB2-BD59-A6C34878D82A}">
-                    <a16:rowId xmlns:a16="http://schemas.microsoft.com/office/drawing/2014/main" xmlns="" val="1001681582"/>
+                    <a16:rowId xmlns:a16="http://schemas.microsoft.com/office/drawing/2014/main" val="1001681582"/>
                   </a:ext>
                 </a:extLst>
               </a:tr>
@@ -6853,7 +6939,7 @@
           <p:cNvPr id="4" name="Picture 3">
             <a:extLst>
               <a:ext uri="{FF2B5EF4-FFF2-40B4-BE49-F238E27FC236}">
-                <a16:creationId xmlns:a16="http://schemas.microsoft.com/office/drawing/2014/main" xmlns="" id="{8026AED6-E793-48A3-96AF-36A0D1FE2D70}"/>
+                <a16:creationId xmlns:a16="http://schemas.microsoft.com/office/drawing/2014/main" id="{8026AED6-E793-48A3-96AF-36A0D1FE2D70}"/>
               </a:ext>
             </a:extLst>
           </p:cNvPr>
@@ -6883,7 +6969,7 @@
           <p:cNvPr id="11" name="Picture 10" descr="A close up of a sign&#10;&#10;Description automatically generated">
             <a:extLst>
               <a:ext uri="{FF2B5EF4-FFF2-40B4-BE49-F238E27FC236}">
-                <a16:creationId xmlns:a16="http://schemas.microsoft.com/office/drawing/2014/main" xmlns="" id="{C8EA3854-8902-4417-899A-DE9CBF528C1A}"/>
+                <a16:creationId xmlns:a16="http://schemas.microsoft.com/office/drawing/2014/main" id="{C8EA3854-8902-4417-899A-DE9CBF528C1A}"/>
               </a:ext>
             </a:extLst>
           </p:cNvPr>
@@ -6919,7 +7005,7 @@
           <p:cNvPr id="6" name="Picture 5" descr="A picture containing drawing&#10;&#10;Description automatically generated">
             <a:extLst>
               <a:ext uri="{FF2B5EF4-FFF2-40B4-BE49-F238E27FC236}">
-                <a16:creationId xmlns:a16="http://schemas.microsoft.com/office/drawing/2014/main" xmlns="" id="{DA3B82F8-7F36-4AE6-A785-76BCA479C67E}"/>
+                <a16:creationId xmlns:a16="http://schemas.microsoft.com/office/drawing/2014/main" id="{DA3B82F8-7F36-4AE6-A785-76BCA479C67E}"/>
               </a:ext>
             </a:extLst>
           </p:cNvPr>
@@ -6955,7 +7041,7 @@
           <p:cNvPr id="3" name="TextBox 2">
             <a:extLst>
               <a:ext uri="{FF2B5EF4-FFF2-40B4-BE49-F238E27FC236}">
-                <a16:creationId xmlns:a16="http://schemas.microsoft.com/office/drawing/2014/main" xmlns="" id="{213A4643-7707-418F-8506-2424A3C57FDB}"/>
+                <a16:creationId xmlns:a16="http://schemas.microsoft.com/office/drawing/2014/main" id="{213A4643-7707-418F-8506-2424A3C57FDB}"/>
               </a:ext>
             </a:extLst>
           </p:cNvPr>
@@ -7029,7 +7115,7 @@
           <p:cNvPr id="13" name="Title 12">
             <a:extLst>
               <a:ext uri="{FF2B5EF4-FFF2-40B4-BE49-F238E27FC236}">
-                <a16:creationId xmlns:a16="http://schemas.microsoft.com/office/drawing/2014/main" xmlns="" id="{98058B23-DDE2-4F62-9A2E-46739C3C685F}"/>
+                <a16:creationId xmlns:a16="http://schemas.microsoft.com/office/drawing/2014/main" id="{98058B23-DDE2-4F62-9A2E-46739C3C685F}"/>
               </a:ext>
             </a:extLst>
           </p:cNvPr>
@@ -7050,12 +7136,6 @@
           <a:bodyPr/>
           <a:lstStyle/>
           <a:p>
-            <a:r>
-              <a:rPr lang="en-US">
-                <a:latin typeface="Marcellus" panose="020E0602050203020307" pitchFamily="34" charset="0"/>
-              </a:rPr>
-              <a:t/>
-            </a:r>
             <a:br>
               <a:rPr lang="en-US">
                 <a:latin typeface="Marcellus" panose="020E0602050203020307" pitchFamily="34" charset="0"/>
@@ -7072,7 +7152,7 @@
           <p:cNvPr id="7" name="Content Placeholder 6">
             <a:extLst>
               <a:ext uri="{FF2B5EF4-FFF2-40B4-BE49-F238E27FC236}">
-                <a16:creationId xmlns:a16="http://schemas.microsoft.com/office/drawing/2014/main" xmlns="" id="{E62F48CB-ECEC-4DBC-A3BD-DEBABF44F413}"/>
+                <a16:creationId xmlns:a16="http://schemas.microsoft.com/office/drawing/2014/main" id="{E62F48CB-ECEC-4DBC-A3BD-DEBABF44F413}"/>
               </a:ext>
             </a:extLst>
           </p:cNvPr>
@@ -7083,14 +7163,14 @@
             <p:ph idx="1"/>
             <p:extLst>
               <p:ext uri="{D42A27DB-BD31-4B8C-83A1-F6EECF244321}">
-                <p14:modId xmlns:p14="http://schemas.microsoft.com/office/powerpoint/2010/main" val="3630080541"/>
+                <p14:modId xmlns:p14="http://schemas.microsoft.com/office/powerpoint/2010/main" val="1460722348"/>
               </p:ext>
             </p:extLst>
           </p:nvPr>
         </p:nvGraphicFramePr>
         <p:xfrm>
           <a:off x="560717" y="-1"/>
-          <a:ext cx="11643407" cy="6187440"/>
+          <a:ext cx="11643406" cy="6736080"/>
         </p:xfrm>
         <a:graphic>
           <a:graphicData uri="http://schemas.openxmlformats.org/drawingml/2006/table">
@@ -7099,31 +7179,38 @@
                 <a:tableStyleId>{5C22544A-7EE6-4342-B048-85BDC9FD1C3A}</a:tableStyleId>
               </a:tblPr>
               <a:tblGrid>
-                <a:gridCol w="487680">
+                <a:gridCol w="512303">
                   <a:extLst>
                     <a:ext uri="{9D8B030D-6E8A-4147-A177-3AD203B41FA5}">
-                      <a16:colId xmlns:a16="http://schemas.microsoft.com/office/drawing/2014/main" xmlns="" val="1875879478"/>
+                      <a16:colId xmlns:a16="http://schemas.microsoft.com/office/drawing/2014/main" val="1875879478"/>
                     </a:ext>
                   </a:extLst>
                 </a:gridCol>
-                <a:gridCol w="1972782">
+                <a:gridCol w="1194319">
                   <a:extLst>
                     <a:ext uri="{9D8B030D-6E8A-4147-A177-3AD203B41FA5}">
-                      <a16:colId xmlns:a16="http://schemas.microsoft.com/office/drawing/2014/main" xmlns="" val="267455062"/>
+                      <a16:colId xmlns:a16="http://schemas.microsoft.com/office/drawing/2014/main" val="267455062"/>
                     </a:ext>
                   </a:extLst>
                 </a:gridCol>
-                <a:gridCol w="5303520">
+                <a:gridCol w="4665306">
                   <a:extLst>
                     <a:ext uri="{9D8B030D-6E8A-4147-A177-3AD203B41FA5}">
-                      <a16:colId xmlns:a16="http://schemas.microsoft.com/office/drawing/2014/main" xmlns="" val="3533694397"/>
+                      <a16:colId xmlns:a16="http://schemas.microsoft.com/office/drawing/2014/main" val="3533694397"/>
                     </a:ext>
                   </a:extLst>
                 </a:gridCol>
-                <a:gridCol w="3879425">
+                <a:gridCol w="3629608">
                   <a:extLst>
                     <a:ext uri="{9D8B030D-6E8A-4147-A177-3AD203B41FA5}">
-                      <a16:colId xmlns:a16="http://schemas.microsoft.com/office/drawing/2014/main" xmlns="" val="713613833"/>
+                      <a16:colId xmlns:a16="http://schemas.microsoft.com/office/drawing/2014/main" val="713613833"/>
+                    </a:ext>
+                  </a:extLst>
+                </a:gridCol>
+                <a:gridCol w="1641870">
+                  <a:extLst>
+                    <a:ext uri="{9D8B030D-6E8A-4147-A177-3AD203B41FA5}">
+                      <a16:colId xmlns:a16="http://schemas.microsoft.com/office/drawing/2014/main" val="1250577683"/>
                     </a:ext>
                   </a:extLst>
                 </a:gridCol>
@@ -7159,12 +7246,12 @@
                     <a:p>
                       <a:pPr rtl="0" fontAlgn="base"/>
                       <a:r>
-                        <a:rPr lang="en-US">
+                        <a:rPr lang="en-US" dirty="0">
                           <a:effectLst/>
                         </a:rPr>
                         <a:t>Topic​</a:t>
                       </a:r>
-                      <a:endParaRPr lang="en-US" b="1">
+                      <a:endParaRPr lang="en-US" b="1" dirty="0">
                         <a:effectLst/>
                       </a:endParaRPr>
                     </a:p>
@@ -7205,12 +7292,12 @@
                     <a:p>
                       <a:pPr rtl="0" fontAlgn="base"/>
                       <a:r>
-                        <a:rPr lang="en-US">
+                        <a:rPr lang="en-US" dirty="0">
                           <a:effectLst/>
                         </a:rPr>
                         <a:t>Conclusion​</a:t>
                       </a:r>
-                      <a:endParaRPr lang="en-US" b="1">
+                      <a:endParaRPr lang="en-US" b="1" dirty="0">
                         <a:effectLst/>
                       </a:endParaRPr>
                     </a:p>
@@ -7221,13 +7308,33 @@
                     </a:solidFill>
                   </a:tcPr>
                 </a:tc>
+                <a:tc>
+                  <a:txBody>
+                    <a:bodyPr/>
+                    <a:lstStyle/>
+                    <a:p>
+                      <a:pPr rtl="0" fontAlgn="base"/>
+                      <a:r>
+                        <a:rPr lang="en-US" b="1" dirty="0">
+                          <a:effectLst/>
+                        </a:rPr>
+                        <a:t>Disadvantages</a:t>
+                      </a:r>
+                    </a:p>
+                  </a:txBody>
+                  <a:tcPr>
+                    <a:solidFill>
+                      <a:srgbClr val="C00000"/>
+                    </a:solidFill>
+                  </a:tcPr>
+                </a:tc>
                 <a:extLst>
                   <a:ext uri="{0D108BD9-81ED-4DB2-BD59-A6C34878D82A}">
-                    <a16:rowId xmlns:a16="http://schemas.microsoft.com/office/drawing/2014/main" xmlns="" val="370026649"/>
+                    <a16:rowId xmlns:a16="http://schemas.microsoft.com/office/drawing/2014/main" val="370026649"/>
                   </a:ext>
                 </a:extLst>
               </a:tr>
-              <a:tr h="1745180">
+              <a:tr h="0">
                 <a:tc>
                   <a:txBody>
                     <a:bodyPr/>
@@ -7273,24 +7380,24 @@
                     <a:p>
                       <a:pPr algn="l" rtl="0" fontAlgn="base"/>
                       <a:r>
-                        <a:rPr lang="en-US">
+                        <a:rPr lang="en-US" dirty="0">
                           <a:effectLst/>
                         </a:rPr>
                         <a:t>This paper presents a general framework for daily meal plan recommendations with the simultaneous management of nutritional-aware and preference-aware information. The proposal incorporates a pre-filtering stage that uses </a:t>
                       </a:r>
                       <a:r>
-                        <a:rPr lang="en-US" err="1">
+                        <a:rPr lang="en-US" dirty="0" err="1">
                           <a:effectLst/>
                         </a:rPr>
                         <a:t>AHPSort</a:t>
                       </a:r>
                       <a:r>
-                        <a:rPr lang="en-US">
+                        <a:rPr lang="en-US" dirty="0">
                           <a:effectLst/>
                         </a:rPr>
                         <a:t> as multi-criteria decision analysis tool for filtering out foods which are not appropriate to the current user characteristics. Furthermore, it incorporates an optimization-based stage for generating a daily meal plan whose goal is the recommendation of food highly preferred by the user, not consumed recently, and satisfying his/her daily nutritional requirements.​</a:t>
                       </a:r>
-                      <a:endParaRPr lang="en-US">
+                      <a:endParaRPr lang="en-US" dirty="0">
                         <a:solidFill>
                           <a:srgbClr val="000000"/>
                         </a:solidFill>
@@ -7307,12 +7414,12 @@
                     <a:p>
                       <a:pPr algn="l" rtl="0" fontAlgn="base"/>
                       <a:r>
-                        <a:rPr lang="en-US">
+                        <a:rPr lang="en-US" dirty="0">
                           <a:effectLst/>
                         </a:rPr>
                         <a:t>The current paper has presented a food recommendation approach focused on generating daily personalized meal plans for the users, according to their nutritional necessities and previous food preferences. It presents a general architecture for food recommendation, composed by an information gathering layer, the user profile dataset, the intelligent system layer, and an end user interface.​</a:t>
                       </a:r>
-                      <a:endParaRPr lang="en-US">
+                      <a:endParaRPr lang="en-US" dirty="0">
                         <a:solidFill>
                           <a:srgbClr val="000000"/>
                         </a:solidFill>
@@ -7322,9 +7429,28 @@
                   </a:txBody>
                   <a:tcPr/>
                 </a:tc>
+                <a:tc>
+                  <a:txBody>
+                    <a:bodyPr/>
+                    <a:lstStyle/>
+                    <a:p>
+                      <a:pPr algn="l" rtl="0" fontAlgn="base"/>
+                      <a:r>
+                        <a:rPr lang="en-US" dirty="0">
+                          <a:solidFill>
+                            <a:srgbClr val="000000"/>
+                          </a:solidFill>
+                          <a:effectLst/>
+                        </a:rPr>
+                        <a:t>Does not take into account health conditions of the users.</a:t>
+                      </a:r>
+                    </a:p>
+                  </a:txBody>
+                  <a:tcPr/>
+                </a:tc>
                 <a:extLst>
                   <a:ext uri="{0D108BD9-81ED-4DB2-BD59-A6C34878D82A}">
-                    <a16:rowId xmlns:a16="http://schemas.microsoft.com/office/drawing/2014/main" xmlns="" val="653355190"/>
+                    <a16:rowId xmlns:a16="http://schemas.microsoft.com/office/drawing/2014/main" val="653355190"/>
                   </a:ext>
                 </a:extLst>
               </a:tr>
@@ -7394,12 +7520,12 @@
                     <a:p>
                       <a:pPr algn="l" rtl="0" fontAlgn="base"/>
                       <a:r>
-                        <a:rPr lang="en-US">
+                        <a:rPr lang="en-US" dirty="0">
                           <a:effectLst/>
                         </a:rPr>
                         <a:t>The experimental results show that compared to single node execution, the convergence time of parallel execution on cloud is approximately 12 times lower. Moreover, adequate accuracy is attainable by increasing the number of ants​</a:t>
                       </a:r>
-                      <a:endParaRPr lang="en-US">
+                      <a:endParaRPr lang="en-US" dirty="0">
                         <a:solidFill>
                           <a:srgbClr val="000000"/>
                         </a:solidFill>
@@ -7409,9 +7535,28 @@
                   </a:txBody>
                   <a:tcPr/>
                 </a:tc>
+                <a:tc>
+                  <a:txBody>
+                    <a:bodyPr/>
+                    <a:lstStyle/>
+                    <a:p>
+                      <a:pPr algn="l" rtl="0" fontAlgn="base"/>
+                      <a:r>
+                        <a:rPr lang="en-US" dirty="0">
+                          <a:solidFill>
+                            <a:srgbClr val="000000"/>
+                          </a:solidFill>
+                          <a:effectLst/>
+                        </a:rPr>
+                        <a:t>Does not recommend workout to users.</a:t>
+                      </a:r>
+                    </a:p>
+                  </a:txBody>
+                  <a:tcPr/>
+                </a:tc>
                 <a:extLst>
                   <a:ext uri="{0D108BD9-81ED-4DB2-BD59-A6C34878D82A}">
-                    <a16:rowId xmlns:a16="http://schemas.microsoft.com/office/drawing/2014/main" xmlns="" val="3621258038"/>
+                    <a16:rowId xmlns:a16="http://schemas.microsoft.com/office/drawing/2014/main" val="3621258038"/>
                   </a:ext>
                 </a:extLst>
               </a:tr>
@@ -7424,7 +7569,7 @@
           <p:cNvPr id="4" name="Picture 3">
             <a:extLst>
               <a:ext uri="{FF2B5EF4-FFF2-40B4-BE49-F238E27FC236}">
-                <a16:creationId xmlns:a16="http://schemas.microsoft.com/office/drawing/2014/main" xmlns="" id="{8026AED6-E793-48A3-96AF-36A0D1FE2D70}"/>
+                <a16:creationId xmlns:a16="http://schemas.microsoft.com/office/drawing/2014/main" id="{8026AED6-E793-48A3-96AF-36A0D1FE2D70}"/>
               </a:ext>
             </a:extLst>
           </p:cNvPr>
@@ -7454,7 +7599,7 @@
           <p:cNvPr id="11" name="Picture 10" descr="A close up of a sign&#10;&#10;Description automatically generated">
             <a:extLst>
               <a:ext uri="{FF2B5EF4-FFF2-40B4-BE49-F238E27FC236}">
-                <a16:creationId xmlns:a16="http://schemas.microsoft.com/office/drawing/2014/main" xmlns="" id="{C8EA3854-8902-4417-899A-DE9CBF528C1A}"/>
+                <a16:creationId xmlns:a16="http://schemas.microsoft.com/office/drawing/2014/main" id="{C8EA3854-8902-4417-899A-DE9CBF528C1A}"/>
               </a:ext>
             </a:extLst>
           </p:cNvPr>
@@ -7490,7 +7635,7 @@
           <p:cNvPr id="6" name="Picture 5" descr="A picture containing drawing&#10;&#10;Description automatically generated">
             <a:extLst>
               <a:ext uri="{FF2B5EF4-FFF2-40B4-BE49-F238E27FC236}">
-                <a16:creationId xmlns:a16="http://schemas.microsoft.com/office/drawing/2014/main" xmlns="" id="{DA3B82F8-7F36-4AE6-A785-76BCA479C67E}"/>
+                <a16:creationId xmlns:a16="http://schemas.microsoft.com/office/drawing/2014/main" id="{DA3B82F8-7F36-4AE6-A785-76BCA479C67E}"/>
               </a:ext>
             </a:extLst>
           </p:cNvPr>
@@ -7513,8 +7658,8 @@
         </p:blipFill>
         <p:spPr>
           <a:xfrm>
-            <a:off x="561580" y="6188417"/>
-            <a:ext cx="2655568" cy="663892"/>
+            <a:off x="463783" y="6376780"/>
+            <a:ext cx="1327784" cy="331946"/>
           </a:xfrm>
           <a:prstGeom prst="rect">
             <a:avLst/>
@@ -7564,7 +7709,7 @@
           <p:cNvPr id="13" name="Title 12">
             <a:extLst>
               <a:ext uri="{FF2B5EF4-FFF2-40B4-BE49-F238E27FC236}">
-                <a16:creationId xmlns:a16="http://schemas.microsoft.com/office/drawing/2014/main" xmlns="" id="{98058B23-DDE2-4F62-9A2E-46739C3C685F}"/>
+                <a16:creationId xmlns:a16="http://schemas.microsoft.com/office/drawing/2014/main" id="{98058B23-DDE2-4F62-9A2E-46739C3C685F}"/>
               </a:ext>
             </a:extLst>
           </p:cNvPr>
@@ -7585,12 +7730,6 @@
           <a:bodyPr/>
           <a:lstStyle/>
           <a:p>
-            <a:r>
-              <a:rPr lang="en-US" sz="3600">
-                <a:latin typeface="Marcellus" panose="020E0602050203020307" pitchFamily="34" charset="0"/>
-              </a:rPr>
-              <a:t/>
-            </a:r>
             <a:br>
               <a:rPr lang="en-US" sz="3600">
                 <a:latin typeface="Marcellus" panose="020E0602050203020307" pitchFamily="34" charset="0"/>
@@ -7607,7 +7746,7 @@
           <p:cNvPr id="9" name="Content Placeholder 8">
             <a:extLst>
               <a:ext uri="{FF2B5EF4-FFF2-40B4-BE49-F238E27FC236}">
-                <a16:creationId xmlns:a16="http://schemas.microsoft.com/office/drawing/2014/main" xmlns="" id="{3DA2148B-2CB2-43DA-B799-B035C9967C39}"/>
+                <a16:creationId xmlns:a16="http://schemas.microsoft.com/office/drawing/2014/main" id="{3DA2148B-2CB2-43DA-B799-B035C9967C39}"/>
               </a:ext>
             </a:extLst>
           </p:cNvPr>
@@ -7637,32 +7776,38 @@
                 <a:gridCol w="358422">
                   <a:extLst>
                     <a:ext uri="{9D8B030D-6E8A-4147-A177-3AD203B41FA5}">
-                      <a16:colId xmlns:a16="http://schemas.microsoft.com/office/drawing/2014/main" xmlns="" val="3925268655"/>
+                      <a16:colId xmlns:a16="http://schemas.microsoft.com/office/drawing/2014/main" val="3925268655"/>
                     </a:ext>
                   </a:extLst>
                 </a:gridCol>
                 <a:gridCol w="1449989">
                   <a:extLst>
                     <a:ext uri="{9D8B030D-6E8A-4147-A177-3AD203B41FA5}">
-                      <a16:colId xmlns:a16="http://schemas.microsoft.com/office/drawing/2014/main" xmlns="" val="106185652"/>
+                      <a16:colId xmlns:a16="http://schemas.microsoft.com/office/drawing/2014/main" val="106185652"/>
                     </a:ext>
                   </a:extLst>
                 </a:gridCol>
                 <a:gridCol w="3269673">
                   <a:extLst>
                     <a:ext uri="{9D8B030D-6E8A-4147-A177-3AD203B41FA5}">
-                      <a16:colId xmlns:a16="http://schemas.microsoft.com/office/drawing/2014/main" xmlns="" val="1817510831"/>
+                      <a16:colId xmlns:a16="http://schemas.microsoft.com/office/drawing/2014/main" val="1817510831"/>
                     </a:ext>
                   </a:extLst>
                 </a:gridCol>
                 <a:gridCol w="4807527">
                   <a:extLst>
                     <a:ext uri="{9D8B030D-6E8A-4147-A177-3AD203B41FA5}">
-                      <a16:colId xmlns:a16="http://schemas.microsoft.com/office/drawing/2014/main" xmlns="" val="917427177"/>
+                      <a16:colId xmlns:a16="http://schemas.microsoft.com/office/drawing/2014/main" val="917427177"/>
                     </a:ext>
                   </a:extLst>
                 </a:gridCol>
-                <a:gridCol w="1727302"/>
+                <a:gridCol w="1727302">
+                  <a:extLst>
+                    <a:ext uri="{9D8B030D-6E8A-4147-A177-3AD203B41FA5}">
+                      <a16:colId xmlns:a16="http://schemas.microsoft.com/office/drawing/2014/main" val="20004"/>
+                    </a:ext>
+                  </a:extLst>
+                </a:gridCol>
               </a:tblGrid>
               <a:tr h="457200">
                 <a:tc>
@@ -7676,7 +7821,7 @@
                         </a:lnSpc>
                       </a:pPr>
                       <a:r>
-                        <a:rPr lang="en-US" dirty="0" smtClean="0">
+                        <a:rPr lang="en-US" dirty="0">
                           <a:effectLst/>
                         </a:rPr>
                         <a:t>​</a:t>
@@ -7768,14 +7913,11 @@
                     <a:p>
                       <a:pPr rtl="0" fontAlgn="base"/>
                       <a:r>
-                        <a:rPr lang="en-US" b="1" dirty="0" smtClean="0">
+                        <a:rPr lang="en-US" b="1" dirty="0">
                           <a:effectLst/>
                         </a:rPr>
                         <a:t>Disadvantages</a:t>
                       </a:r>
-                      <a:endParaRPr lang="en-US" b="1" dirty="0">
-                        <a:effectLst/>
-                      </a:endParaRPr>
                     </a:p>
                   </a:txBody>
                   <a:tcPr>
@@ -7786,7 +7928,7 @@
                 </a:tc>
                 <a:extLst>
                   <a:ext uri="{0D108BD9-81ED-4DB2-BD59-A6C34878D82A}">
-                    <a16:rowId xmlns:a16="http://schemas.microsoft.com/office/drawing/2014/main" xmlns="" val="1828088283"/>
+                    <a16:rowId xmlns:a16="http://schemas.microsoft.com/office/drawing/2014/main" val="1828088283"/>
                   </a:ext>
                 </a:extLst>
               </a:tr>
@@ -7839,43 +7981,19 @@
                         <a:rPr lang="en-US" dirty="0">
                           <a:effectLst/>
                         </a:rPr>
-                        <a:t>The main aim is to develop a method to provide every user with meals of their choice, while ensuring that the correct proportion of nutrients are present in them. This is done by developing a diet recommendation system which recommends </a:t>
+                        <a:t>The main aim is to develop a method to provide every user with meals of their choice, while ensuring that the correct proportion of nutrients are present in them. This is done by developing a diet recommendation system which recommends a</a:t>
                       </a:r>
                       <a:r>
-                        <a:rPr lang="en-US" dirty="0" smtClean="0">
-                          <a:effectLst/>
-                        </a:rPr>
-                        <a:t>a</a:t>
-                      </a:r>
-                      <a:r>
-                        <a:rPr lang="en-US" baseline="0" dirty="0" smtClean="0">
+                        <a:rPr lang="en-US" baseline="0" dirty="0">
                           <a:effectLst/>
                         </a:rPr>
                         <a:t> </a:t>
                       </a:r>
                       <a:r>
-                        <a:rPr lang="en-US" dirty="0" smtClean="0">
-                          <a:effectLst/>
-                        </a:rPr>
-                        <a:t>healthy</a:t>
-                      </a:r>
-                      <a:r>
                         <a:rPr lang="en-US" dirty="0">
                           <a:effectLst/>
                         </a:rPr>
-                        <a:t> and appropriate food quantity to </a:t>
-                      </a:r>
-                      <a:r>
-                        <a:rPr lang="en-US" dirty="0" smtClean="0">
-                          <a:effectLst/>
-                        </a:rPr>
-                        <a:t>​users</a:t>
-                      </a:r>
-                      <a:r>
-                        <a:rPr lang="en-US" dirty="0">
-                          <a:effectLst/>
-                        </a:rPr>
-                        <a:t>.​</a:t>
+                        <a:t>healthy and appropriate food quantity to ​users.​</a:t>
                       </a:r>
                     </a:p>
                   </a:txBody>
@@ -7891,19 +8009,7 @@
                         <a:rPr lang="en-US" dirty="0">
                           <a:effectLst/>
                         </a:rPr>
-                        <a:t>The system presented is made up of two parts: the first part provides content based diet recommendation while the second part uses Pearson Correlation Coefficient to compare food nutrients and recommends alternative food items, thus allowing users to make choices</a:t>
-                      </a:r>
-                      <a:r>
-                        <a:rPr lang="en-US" dirty="0" smtClean="0">
-                          <a:effectLst/>
-                        </a:rPr>
-                        <a:t>.</a:t>
-                      </a:r>
-                      <a:r>
-                        <a:rPr lang="en-US" dirty="0">
-                          <a:effectLst/>
-                        </a:rPr>
-                        <a:t> Thus, a system  that considers an individual’s daily energy requirement in order to maintain a healthy weight and reduce the risk of chronic diseases has been developed by considering the food preferences of the user.​</a:t>
+                        <a:t>The system presented is made up of two parts: the first part provides content based diet recommendation while the second part uses Pearson Correlation Coefficient to compare food nutrients and recommends alternative food items, thus allowing users to make choices. Thus, a system  that considers an individual’s daily energy requirement in order to maintain a healthy weight and reduce the risk of chronic diseases has been developed by considering the food preferences of the user.​</a:t>
                       </a:r>
                       <a:endParaRPr lang="en-US" dirty="0">
                         <a:solidFill>
@@ -7938,7 +8044,7 @@
                         <a:defRPr/>
                       </a:pPr>
                       <a:r>
-                        <a:rPr lang="en-US" sz="1800" kern="1200" dirty="0" smtClean="0">
+                        <a:rPr lang="en-US" sz="1800" kern="1200" dirty="0">
                           <a:solidFill>
                             <a:schemeClr val="dk1"/>
                           </a:solidFill>
@@ -7949,7 +8055,7 @@
                         </a:rPr>
                         <a:t>The system did not consider any existing health issues that a user might be dealing with.</a:t>
                       </a:r>
-                      <a:endParaRPr lang="en-IN" sz="1800" kern="1200" dirty="0" smtClean="0">
+                      <a:endParaRPr lang="en-IN" sz="1800" kern="1200" dirty="0">
                         <a:solidFill>
                           <a:schemeClr val="dk1"/>
                         </a:solidFill>
@@ -7973,7 +8079,7 @@
                 </a:tc>
                 <a:extLst>
                   <a:ext uri="{0D108BD9-81ED-4DB2-BD59-A6C34878D82A}">
-                    <a16:rowId xmlns:a16="http://schemas.microsoft.com/office/drawing/2014/main" xmlns="" val="1001681582"/>
+                    <a16:rowId xmlns:a16="http://schemas.microsoft.com/office/drawing/2014/main" val="1001681582"/>
                   </a:ext>
                 </a:extLst>
               </a:tr>
@@ -8067,7 +8173,7 @@
                     <a:p>
                       <a:pPr algn="l" rtl="0" fontAlgn="base"/>
                       <a:r>
-                        <a:rPr lang="en-US" dirty="0" smtClean="0">
+                        <a:rPr lang="en-US" dirty="0">
                           <a:solidFill>
                             <a:srgbClr val="000000"/>
                           </a:solidFill>
@@ -8076,7 +8182,7 @@
                         <a:t>The users</a:t>
                       </a:r>
                       <a:r>
-                        <a:rPr lang="en-US" baseline="0" dirty="0" smtClean="0">
+                        <a:rPr lang="en-US" baseline="0" dirty="0">
                           <a:solidFill>
                             <a:srgbClr val="000000"/>
                           </a:solidFill>
@@ -8096,7 +8202,7 @@
                 </a:tc>
                 <a:extLst>
                   <a:ext uri="{0D108BD9-81ED-4DB2-BD59-A6C34878D82A}">
-                    <a16:rowId xmlns:a16="http://schemas.microsoft.com/office/drawing/2014/main" xmlns="" val="924591228"/>
+                    <a16:rowId xmlns:a16="http://schemas.microsoft.com/office/drawing/2014/main" val="924591228"/>
                   </a:ext>
                 </a:extLst>
               </a:tr>
@@ -8109,7 +8215,7 @@
           <p:cNvPr id="4" name="Picture 3">
             <a:extLst>
               <a:ext uri="{FF2B5EF4-FFF2-40B4-BE49-F238E27FC236}">
-                <a16:creationId xmlns:a16="http://schemas.microsoft.com/office/drawing/2014/main" xmlns="" id="{8026AED6-E793-48A3-96AF-36A0D1FE2D70}"/>
+                <a16:creationId xmlns:a16="http://schemas.microsoft.com/office/drawing/2014/main" id="{8026AED6-E793-48A3-96AF-36A0D1FE2D70}"/>
               </a:ext>
             </a:extLst>
           </p:cNvPr>
@@ -8139,7 +8245,7 @@
           <p:cNvPr id="11" name="Picture 10" descr="A close up of a sign&#10;&#10;Description automatically generated">
             <a:extLst>
               <a:ext uri="{FF2B5EF4-FFF2-40B4-BE49-F238E27FC236}">
-                <a16:creationId xmlns:a16="http://schemas.microsoft.com/office/drawing/2014/main" xmlns="" id="{C8EA3854-8902-4417-899A-DE9CBF528C1A}"/>
+                <a16:creationId xmlns:a16="http://schemas.microsoft.com/office/drawing/2014/main" id="{C8EA3854-8902-4417-899A-DE9CBF528C1A}"/>
               </a:ext>
             </a:extLst>
           </p:cNvPr>
@@ -8175,7 +8281,7 @@
           <p:cNvPr id="6" name="Picture 5" descr="A picture containing drawing&#10;&#10;Description automatically generated">
             <a:extLst>
               <a:ext uri="{FF2B5EF4-FFF2-40B4-BE49-F238E27FC236}">
-                <a16:creationId xmlns:a16="http://schemas.microsoft.com/office/drawing/2014/main" xmlns="" id="{DA3B82F8-7F36-4AE6-A785-76BCA479C67E}"/>
+                <a16:creationId xmlns:a16="http://schemas.microsoft.com/office/drawing/2014/main" id="{DA3B82F8-7F36-4AE6-A785-76BCA479C67E}"/>
               </a:ext>
             </a:extLst>
           </p:cNvPr>
@@ -8241,7 +8347,7 @@
           <p:cNvPr id="6" name="Picture 5" descr="A picture containing drawing&#10;&#10;Description automatically generated">
             <a:extLst>
               <a:ext uri="{FF2B5EF4-FFF2-40B4-BE49-F238E27FC236}">
-                <a16:creationId xmlns:a16="http://schemas.microsoft.com/office/drawing/2014/main" xmlns="" id="{DA3B82F8-7F36-4AE6-A785-76BCA479C67E}"/>
+                <a16:creationId xmlns:a16="http://schemas.microsoft.com/office/drawing/2014/main" id="{DA3B82F8-7F36-4AE6-A785-76BCA479C67E}"/>
               </a:ext>
             </a:extLst>
           </p:cNvPr>
@@ -8277,7 +8383,7 @@
           <p:cNvPr id="13" name="Title 12">
             <a:extLst>
               <a:ext uri="{FF2B5EF4-FFF2-40B4-BE49-F238E27FC236}">
-                <a16:creationId xmlns:a16="http://schemas.microsoft.com/office/drawing/2014/main" xmlns="" id="{98058B23-DDE2-4F62-9A2E-46739C3C685F}"/>
+                <a16:creationId xmlns:a16="http://schemas.microsoft.com/office/drawing/2014/main" id="{98058B23-DDE2-4F62-9A2E-46739C3C685F}"/>
               </a:ext>
             </a:extLst>
           </p:cNvPr>
@@ -8298,12 +8404,6 @@
           <a:bodyPr/>
           <a:lstStyle/>
           <a:p>
-            <a:r>
-              <a:rPr lang="en-US" sz="3600">
-                <a:latin typeface="Marcellus" panose="020E0602050203020307" pitchFamily="34" charset="0"/>
-              </a:rPr>
-              <a:t/>
-            </a:r>
             <a:br>
               <a:rPr lang="en-US" sz="3600">
                 <a:latin typeface="Marcellus" panose="020E0602050203020307" pitchFamily="34" charset="0"/>
@@ -8320,7 +8420,7 @@
           <p:cNvPr id="9" name="Content Placeholder 8">
             <a:extLst>
               <a:ext uri="{FF2B5EF4-FFF2-40B4-BE49-F238E27FC236}">
-                <a16:creationId xmlns:a16="http://schemas.microsoft.com/office/drawing/2014/main" xmlns="" id="{3DA2148B-2CB2-43DA-B799-B035C9967C39}"/>
+                <a16:creationId xmlns:a16="http://schemas.microsoft.com/office/drawing/2014/main" id="{3DA2148B-2CB2-43DA-B799-B035C9967C39}"/>
               </a:ext>
             </a:extLst>
           </p:cNvPr>
@@ -8350,28 +8450,28 @@
                 <a:gridCol w="1041492">
                   <a:extLst>
                     <a:ext uri="{9D8B030D-6E8A-4147-A177-3AD203B41FA5}">
-                      <a16:colId xmlns:a16="http://schemas.microsoft.com/office/drawing/2014/main" xmlns="" val="106185652"/>
+                      <a16:colId xmlns:a16="http://schemas.microsoft.com/office/drawing/2014/main" val="106185652"/>
                     </a:ext>
                   </a:extLst>
                 </a:gridCol>
                 <a:gridCol w="3024346">
                   <a:extLst>
                     <a:ext uri="{9D8B030D-6E8A-4147-A177-3AD203B41FA5}">
-                      <a16:colId xmlns:a16="http://schemas.microsoft.com/office/drawing/2014/main" xmlns="" val="20001"/>
+                      <a16:colId xmlns:a16="http://schemas.microsoft.com/office/drawing/2014/main" val="20001"/>
                     </a:ext>
                   </a:extLst>
                 </a:gridCol>
                 <a:gridCol w="3075709">
                   <a:extLst>
                     <a:ext uri="{9D8B030D-6E8A-4147-A177-3AD203B41FA5}">
-                      <a16:colId xmlns:a16="http://schemas.microsoft.com/office/drawing/2014/main" xmlns="" val="1817510831"/>
+                      <a16:colId xmlns:a16="http://schemas.microsoft.com/office/drawing/2014/main" val="1817510831"/>
                     </a:ext>
                   </a:extLst>
                 </a:gridCol>
                 <a:gridCol w="4364182">
                   <a:extLst>
                     <a:ext uri="{9D8B030D-6E8A-4147-A177-3AD203B41FA5}">
-                      <a16:colId xmlns:a16="http://schemas.microsoft.com/office/drawing/2014/main" xmlns="" val="917427177"/>
+                      <a16:colId xmlns:a16="http://schemas.microsoft.com/office/drawing/2014/main" val="917427177"/>
                     </a:ext>
                   </a:extLst>
                 </a:gridCol>
@@ -8481,7 +8581,7 @@
                 </a:tc>
                 <a:extLst>
                   <a:ext uri="{0D108BD9-81ED-4DB2-BD59-A6C34878D82A}">
-                    <a16:rowId xmlns:a16="http://schemas.microsoft.com/office/drawing/2014/main" xmlns="" val="1828088283"/>
+                    <a16:rowId xmlns:a16="http://schemas.microsoft.com/office/drawing/2014/main" val="1828088283"/>
                   </a:ext>
                 </a:extLst>
               </a:tr>
@@ -8581,7 +8681,7 @@
                 </a:tc>
                 <a:extLst>
                   <a:ext uri="{0D108BD9-81ED-4DB2-BD59-A6C34878D82A}">
-                    <a16:rowId xmlns:a16="http://schemas.microsoft.com/office/drawing/2014/main" xmlns="" val="1001681582"/>
+                    <a16:rowId xmlns:a16="http://schemas.microsoft.com/office/drawing/2014/main" val="1001681582"/>
                   </a:ext>
                 </a:extLst>
               </a:tr>
@@ -8659,12 +8759,6 @@
                       <a:endParaRPr lang="en-US" sz="1600" dirty="0"/>
                     </a:p>
                     <a:p>
-                      <a:r>
-                        <a:rPr lang="en-US" sz="1600" dirty="0">
-                          <a:effectLst/>
-                        </a:rPr>
-                        <a:t/>
-                      </a:r>
                       <a:br>
                         <a:rPr lang="en-US" sz="1600" dirty="0">
                           <a:effectLst/>
@@ -8737,7 +8831,7 @@
                 </a:tc>
                 <a:extLst>
                   <a:ext uri="{0D108BD9-81ED-4DB2-BD59-A6C34878D82A}">
-                    <a16:rowId xmlns:a16="http://schemas.microsoft.com/office/drawing/2014/main" xmlns="" val="924591228"/>
+                    <a16:rowId xmlns:a16="http://schemas.microsoft.com/office/drawing/2014/main" val="924591228"/>
                   </a:ext>
                 </a:extLst>
               </a:tr>
@@ -8846,7 +8940,7 @@
                 </a:tc>
                 <a:extLst>
                   <a:ext uri="{0D108BD9-81ED-4DB2-BD59-A6C34878D82A}">
-                    <a16:rowId xmlns:a16="http://schemas.microsoft.com/office/drawing/2014/main" xmlns="" val="10003"/>
+                    <a16:rowId xmlns:a16="http://schemas.microsoft.com/office/drawing/2014/main" val="10003"/>
                   </a:ext>
                 </a:extLst>
               </a:tr>
@@ -8941,7 +9035,7 @@
                 </a:tc>
                 <a:extLst>
                   <a:ext uri="{0D108BD9-81ED-4DB2-BD59-A6C34878D82A}">
-                    <a16:rowId xmlns:a16="http://schemas.microsoft.com/office/drawing/2014/main" xmlns="" val="10004"/>
+                    <a16:rowId xmlns:a16="http://schemas.microsoft.com/office/drawing/2014/main" val="10004"/>
                   </a:ext>
                 </a:extLst>
               </a:tr>
@@ -8954,7 +9048,7 @@
           <p:cNvPr id="4" name="Picture 3">
             <a:extLst>
               <a:ext uri="{FF2B5EF4-FFF2-40B4-BE49-F238E27FC236}">
-                <a16:creationId xmlns:a16="http://schemas.microsoft.com/office/drawing/2014/main" xmlns="" id="{8026AED6-E793-48A3-96AF-36A0D1FE2D70}"/>
+                <a16:creationId xmlns:a16="http://schemas.microsoft.com/office/drawing/2014/main" id="{8026AED6-E793-48A3-96AF-36A0D1FE2D70}"/>
               </a:ext>
             </a:extLst>
           </p:cNvPr>
@@ -8984,7 +9078,7 @@
           <p:cNvPr id="11" name="Picture 10" descr="A close up of a sign&#10;&#10;Description automatically generated">
             <a:extLst>
               <a:ext uri="{FF2B5EF4-FFF2-40B4-BE49-F238E27FC236}">
-                <a16:creationId xmlns:a16="http://schemas.microsoft.com/office/drawing/2014/main" xmlns="" id="{C8EA3854-8902-4417-899A-DE9CBF528C1A}"/>
+                <a16:creationId xmlns:a16="http://schemas.microsoft.com/office/drawing/2014/main" id="{C8EA3854-8902-4417-899A-DE9CBF528C1A}"/>
               </a:ext>
             </a:extLst>
           </p:cNvPr>
@@ -9020,7 +9114,7 @@
           <p:cNvPr id="10" name="Title 12">
             <a:extLst>
               <a:ext uri="{FF2B5EF4-FFF2-40B4-BE49-F238E27FC236}">
-                <a16:creationId xmlns:a16="http://schemas.microsoft.com/office/drawing/2014/main" xmlns="" id="{98058B23-DDE2-4F62-9A2E-46739C3C685F}"/>
+                <a16:creationId xmlns:a16="http://schemas.microsoft.com/office/drawing/2014/main" id="{98058B23-DDE2-4F62-9A2E-46739C3C685F}"/>
               </a:ext>
             </a:extLst>
           </p:cNvPr>
@@ -9088,12 +9182,6 @@
                 <a:latin typeface="Marcellus"/>
               </a:rPr>
               <a:t>?</a:t>
-            </a:r>
-            <a:r>
-              <a:rPr lang="en-US" dirty="0">
-                <a:latin typeface="Marcellus" panose="020E0602050203020307" pitchFamily="34" charset="0"/>
-              </a:rPr>
-              <a:t/>
             </a:r>
             <a:br>
               <a:rPr lang="en-US" dirty="0">
@@ -9141,7 +9229,7 @@
           <p:cNvPr id="13" name="Title 12">
             <a:extLst>
               <a:ext uri="{FF2B5EF4-FFF2-40B4-BE49-F238E27FC236}">
-                <a16:creationId xmlns:a16="http://schemas.microsoft.com/office/drawing/2014/main" xmlns="" id="{98058B23-DDE2-4F62-9A2E-46739C3C685F}"/>
+                <a16:creationId xmlns:a16="http://schemas.microsoft.com/office/drawing/2014/main" id="{98058B23-DDE2-4F62-9A2E-46739C3C685F}"/>
               </a:ext>
             </a:extLst>
           </p:cNvPr>
@@ -9162,12 +9250,6 @@
           <a:bodyPr/>
           <a:lstStyle/>
           <a:p>
-            <a:r>
-              <a:rPr lang="en-US" dirty="0">
-                <a:latin typeface="Marcellus" panose="020E0602050203020307" pitchFamily="34" charset="0"/>
-              </a:rPr>
-              <a:t/>
-            </a:r>
             <a:br>
               <a:rPr lang="en-US" dirty="0">
                 <a:latin typeface="Marcellus" panose="020E0602050203020307" pitchFamily="34" charset="0"/>
@@ -9184,7 +9266,7 @@
           <p:cNvPr id="3" name="Subtitle 2">
             <a:extLst>
               <a:ext uri="{FF2B5EF4-FFF2-40B4-BE49-F238E27FC236}">
-                <a16:creationId xmlns:a16="http://schemas.microsoft.com/office/drawing/2014/main" xmlns="" id="{6D9CEDE5-3115-42FB-90A3-0727B8EEECC0}"/>
+                <a16:creationId xmlns:a16="http://schemas.microsoft.com/office/drawing/2014/main" id="{6D9CEDE5-3115-42FB-90A3-0727B8EEECC0}"/>
               </a:ext>
             </a:extLst>
           </p:cNvPr>
@@ -9235,7 +9317,7 @@
           <p:cNvPr id="4" name="Picture 3">
             <a:extLst>
               <a:ext uri="{FF2B5EF4-FFF2-40B4-BE49-F238E27FC236}">
-                <a16:creationId xmlns:a16="http://schemas.microsoft.com/office/drawing/2014/main" xmlns="" id="{8026AED6-E793-48A3-96AF-36A0D1FE2D70}"/>
+                <a16:creationId xmlns:a16="http://schemas.microsoft.com/office/drawing/2014/main" id="{8026AED6-E793-48A3-96AF-36A0D1FE2D70}"/>
               </a:ext>
             </a:extLst>
           </p:cNvPr>
@@ -9265,7 +9347,7 @@
           <p:cNvPr id="5" name="Picture 4">
             <a:extLst>
               <a:ext uri="{FF2B5EF4-FFF2-40B4-BE49-F238E27FC236}">
-                <a16:creationId xmlns:a16="http://schemas.microsoft.com/office/drawing/2014/main" xmlns="" id="{98F5ADD7-F579-4B31-B088-24730AEA76C9}"/>
+                <a16:creationId xmlns:a16="http://schemas.microsoft.com/office/drawing/2014/main" id="{98F5ADD7-F579-4B31-B088-24730AEA76C9}"/>
               </a:ext>
             </a:extLst>
           </p:cNvPr>
@@ -9295,7 +9377,7 @@
           <p:cNvPr id="11" name="Picture 10" descr="A close up of a sign&#10;&#10;Description automatically generated">
             <a:extLst>
               <a:ext uri="{FF2B5EF4-FFF2-40B4-BE49-F238E27FC236}">
-                <a16:creationId xmlns:a16="http://schemas.microsoft.com/office/drawing/2014/main" xmlns="" id="{C8EA3854-8902-4417-899A-DE9CBF528C1A}"/>
+                <a16:creationId xmlns:a16="http://schemas.microsoft.com/office/drawing/2014/main" id="{C8EA3854-8902-4417-899A-DE9CBF528C1A}"/>
               </a:ext>
             </a:extLst>
           </p:cNvPr>
@@ -9331,7 +9413,7 @@
           <p:cNvPr id="6" name="Picture 5" descr="A picture containing drawing&#10;&#10;Description automatically generated">
             <a:extLst>
               <a:ext uri="{FF2B5EF4-FFF2-40B4-BE49-F238E27FC236}">
-                <a16:creationId xmlns:a16="http://schemas.microsoft.com/office/drawing/2014/main" xmlns="" id="{DA3B82F8-7F36-4AE6-A785-76BCA479C67E}"/>
+                <a16:creationId xmlns:a16="http://schemas.microsoft.com/office/drawing/2014/main" id="{DA3B82F8-7F36-4AE6-A785-76BCA479C67E}"/>
               </a:ext>
             </a:extLst>
           </p:cNvPr>
@@ -9367,7 +9449,7 @@
           <p:cNvPr id="2" name="TextBox 1">
             <a:extLst>
               <a:ext uri="{FF2B5EF4-FFF2-40B4-BE49-F238E27FC236}">
-                <a16:creationId xmlns:a16="http://schemas.microsoft.com/office/drawing/2014/main" xmlns="" id="{74C8FBA2-77DC-4463-B7E2-0ABC8F44D513}"/>
+                <a16:creationId xmlns:a16="http://schemas.microsoft.com/office/drawing/2014/main" id="{74C8FBA2-77DC-4463-B7E2-0ABC8F44D513}"/>
               </a:ext>
             </a:extLst>
           </p:cNvPr>
@@ -9417,7 +9499,7 @@
           <p:cNvPr id="8" name="TextBox 7">
             <a:extLst>
               <a:ext uri="{FF2B5EF4-FFF2-40B4-BE49-F238E27FC236}">
-                <a16:creationId xmlns:a16="http://schemas.microsoft.com/office/drawing/2014/main" xmlns="" id="{581A9D07-7449-4E03-A8E7-1E655F1AB3A5}"/>
+                <a16:creationId xmlns:a16="http://schemas.microsoft.com/office/drawing/2014/main" id="{581A9D07-7449-4E03-A8E7-1E655F1AB3A5}"/>
               </a:ext>
             </a:extLst>
           </p:cNvPr>
@@ -9601,7 +9683,7 @@
           <p:cNvPr id="9" name="TextBox 8">
             <a:extLst>
               <a:ext uri="{FF2B5EF4-FFF2-40B4-BE49-F238E27FC236}">
-                <a16:creationId xmlns:a16="http://schemas.microsoft.com/office/drawing/2014/main" xmlns="" id="{EE02221A-A156-4EEA-8A25-C2C07639B057}"/>
+                <a16:creationId xmlns:a16="http://schemas.microsoft.com/office/drawing/2014/main" id="{EE02221A-A156-4EEA-8A25-C2C07639B057}"/>
               </a:ext>
             </a:extLst>
           </p:cNvPr>
@@ -9778,7 +9860,7 @@
           <p:cNvPr id="7" name="TextBox 6">
             <a:extLst>
               <a:ext uri="{FF2B5EF4-FFF2-40B4-BE49-F238E27FC236}">
-                <a16:creationId xmlns:a16="http://schemas.microsoft.com/office/drawing/2014/main" xmlns="" id="{D3F315B1-8D3C-46A4-BC83-7E6C5571C56B}"/>
+                <a16:creationId xmlns:a16="http://schemas.microsoft.com/office/drawing/2014/main" id="{D3F315B1-8D3C-46A4-BC83-7E6C5571C56B}"/>
               </a:ext>
             </a:extLst>
           </p:cNvPr>
@@ -9822,7 +9904,7 @@
           <p:cNvPr id="10" name="TextBox 9">
             <a:extLst>
               <a:ext uri="{FF2B5EF4-FFF2-40B4-BE49-F238E27FC236}">
-                <a16:creationId xmlns:a16="http://schemas.microsoft.com/office/drawing/2014/main" xmlns="" id="{6B930A84-AC38-496A-84EE-A62466600410}"/>
+                <a16:creationId xmlns:a16="http://schemas.microsoft.com/office/drawing/2014/main" id="{6B930A84-AC38-496A-84EE-A62466600410}"/>
               </a:ext>
             </a:extLst>
           </p:cNvPr>
@@ -9900,7 +9982,7 @@
           <p:cNvPr id="13" name="Title 12">
             <a:extLst>
               <a:ext uri="{FF2B5EF4-FFF2-40B4-BE49-F238E27FC236}">
-                <a16:creationId xmlns:a16="http://schemas.microsoft.com/office/drawing/2014/main" xmlns="" id="{98058B23-DDE2-4F62-9A2E-46739C3C685F}"/>
+                <a16:creationId xmlns:a16="http://schemas.microsoft.com/office/drawing/2014/main" id="{98058B23-DDE2-4F62-9A2E-46739C3C685F}"/>
               </a:ext>
             </a:extLst>
           </p:cNvPr>
@@ -9930,12 +10012,6 @@
               </a:rPr>
               <a:t>Software Design</a:t>
             </a:r>
-            <a:r>
-              <a:rPr lang="en-US" dirty="0">
-                <a:latin typeface="Marcellus" panose="020E0602050203020307" pitchFamily="34" charset="0"/>
-              </a:rPr>
-              <a:t/>
-            </a:r>
             <a:br>
               <a:rPr lang="en-US" dirty="0">
                 <a:latin typeface="Marcellus" panose="020E0602050203020307" pitchFamily="34" charset="0"/>
@@ -9952,7 +10028,7 @@
           <p:cNvPr id="3" name="Subtitle 2">
             <a:extLst>
               <a:ext uri="{FF2B5EF4-FFF2-40B4-BE49-F238E27FC236}">
-                <a16:creationId xmlns:a16="http://schemas.microsoft.com/office/drawing/2014/main" xmlns="" id="{6D9CEDE5-3115-42FB-90A3-0727B8EEECC0}"/>
+                <a16:creationId xmlns:a16="http://schemas.microsoft.com/office/drawing/2014/main" id="{6D9CEDE5-3115-42FB-90A3-0727B8EEECC0}"/>
               </a:ext>
             </a:extLst>
           </p:cNvPr>
@@ -10005,7 +10081,7 @@
           <p:cNvPr id="4" name="Picture 3">
             <a:extLst>
               <a:ext uri="{FF2B5EF4-FFF2-40B4-BE49-F238E27FC236}">
-                <a16:creationId xmlns:a16="http://schemas.microsoft.com/office/drawing/2014/main" xmlns="" id="{8026AED6-E793-48A3-96AF-36A0D1FE2D70}"/>
+                <a16:creationId xmlns:a16="http://schemas.microsoft.com/office/drawing/2014/main" id="{8026AED6-E793-48A3-96AF-36A0D1FE2D70}"/>
               </a:ext>
             </a:extLst>
           </p:cNvPr>
@@ -10035,7 +10111,7 @@
           <p:cNvPr id="5" name="Picture 4">
             <a:extLst>
               <a:ext uri="{FF2B5EF4-FFF2-40B4-BE49-F238E27FC236}">
-                <a16:creationId xmlns:a16="http://schemas.microsoft.com/office/drawing/2014/main" xmlns="" id="{98F5ADD7-F579-4B31-B088-24730AEA76C9}"/>
+                <a16:creationId xmlns:a16="http://schemas.microsoft.com/office/drawing/2014/main" id="{98F5ADD7-F579-4B31-B088-24730AEA76C9}"/>
               </a:ext>
             </a:extLst>
           </p:cNvPr>
@@ -10065,7 +10141,7 @@
           <p:cNvPr id="11" name="Picture 10" descr="A close up of a sign&#10;&#10;Description automatically generated">
             <a:extLst>
               <a:ext uri="{FF2B5EF4-FFF2-40B4-BE49-F238E27FC236}">
-                <a16:creationId xmlns:a16="http://schemas.microsoft.com/office/drawing/2014/main" xmlns="" id="{C8EA3854-8902-4417-899A-DE9CBF528C1A}"/>
+                <a16:creationId xmlns:a16="http://schemas.microsoft.com/office/drawing/2014/main" id="{C8EA3854-8902-4417-899A-DE9CBF528C1A}"/>
               </a:ext>
             </a:extLst>
           </p:cNvPr>
@@ -10101,7 +10177,7 @@
           <p:cNvPr id="6" name="Picture 5" descr="A picture containing drawing&#10;&#10;Description automatically generated">
             <a:extLst>
               <a:ext uri="{FF2B5EF4-FFF2-40B4-BE49-F238E27FC236}">
-                <a16:creationId xmlns:a16="http://schemas.microsoft.com/office/drawing/2014/main" xmlns="" id="{DA3B82F8-7F36-4AE6-A785-76BCA479C67E}"/>
+                <a16:creationId xmlns:a16="http://schemas.microsoft.com/office/drawing/2014/main" id="{DA3B82F8-7F36-4AE6-A785-76BCA479C67E}"/>
               </a:ext>
             </a:extLst>
           </p:cNvPr>
@@ -10197,7 +10273,7 @@
           <p:cNvPr id="13" name="Title 12">
             <a:extLst>
               <a:ext uri="{FF2B5EF4-FFF2-40B4-BE49-F238E27FC236}">
-                <a16:creationId xmlns:a16="http://schemas.microsoft.com/office/drawing/2014/main" xmlns="" id="{98058B23-DDE2-4F62-9A2E-46739C3C685F}"/>
+                <a16:creationId xmlns:a16="http://schemas.microsoft.com/office/drawing/2014/main" id="{98058B23-DDE2-4F62-9A2E-46739C3C685F}"/>
               </a:ext>
             </a:extLst>
           </p:cNvPr>
@@ -10237,7 +10313,7 @@
           <p:cNvPr id="3" name="Subtitle 2">
             <a:extLst>
               <a:ext uri="{FF2B5EF4-FFF2-40B4-BE49-F238E27FC236}">
-                <a16:creationId xmlns:a16="http://schemas.microsoft.com/office/drawing/2014/main" xmlns="" id="{6D9CEDE5-3115-42FB-90A3-0727B8EEECC0}"/>
+                <a16:creationId xmlns:a16="http://schemas.microsoft.com/office/drawing/2014/main" id="{6D9CEDE5-3115-42FB-90A3-0727B8EEECC0}"/>
               </a:ext>
             </a:extLst>
           </p:cNvPr>
@@ -10302,7 +10378,7 @@
           <p:cNvPr id="4" name="Picture 3">
             <a:extLst>
               <a:ext uri="{FF2B5EF4-FFF2-40B4-BE49-F238E27FC236}">
-                <a16:creationId xmlns:a16="http://schemas.microsoft.com/office/drawing/2014/main" xmlns="" id="{8026AED6-E793-48A3-96AF-36A0D1FE2D70}"/>
+                <a16:creationId xmlns:a16="http://schemas.microsoft.com/office/drawing/2014/main" id="{8026AED6-E793-48A3-96AF-36A0D1FE2D70}"/>
               </a:ext>
             </a:extLst>
           </p:cNvPr>
@@ -10332,7 +10408,7 @@
           <p:cNvPr id="5" name="Picture 4">
             <a:extLst>
               <a:ext uri="{FF2B5EF4-FFF2-40B4-BE49-F238E27FC236}">
-                <a16:creationId xmlns:a16="http://schemas.microsoft.com/office/drawing/2014/main" xmlns="" id="{98F5ADD7-F579-4B31-B088-24730AEA76C9}"/>
+                <a16:creationId xmlns:a16="http://schemas.microsoft.com/office/drawing/2014/main" id="{98F5ADD7-F579-4B31-B088-24730AEA76C9}"/>
               </a:ext>
             </a:extLst>
           </p:cNvPr>
@@ -10362,7 +10438,7 @@
           <p:cNvPr id="11" name="Picture 10" descr="A close up of a sign&#10;&#10;Description automatically generated">
             <a:extLst>
               <a:ext uri="{FF2B5EF4-FFF2-40B4-BE49-F238E27FC236}">
-                <a16:creationId xmlns:a16="http://schemas.microsoft.com/office/drawing/2014/main" xmlns="" id="{C8EA3854-8902-4417-899A-DE9CBF528C1A}"/>
+                <a16:creationId xmlns:a16="http://schemas.microsoft.com/office/drawing/2014/main" id="{C8EA3854-8902-4417-899A-DE9CBF528C1A}"/>
               </a:ext>
             </a:extLst>
           </p:cNvPr>
@@ -10398,7 +10474,7 @@
           <p:cNvPr id="6" name="Picture 5" descr="A picture containing drawing&#10;&#10;Description automatically generated">
             <a:extLst>
               <a:ext uri="{FF2B5EF4-FFF2-40B4-BE49-F238E27FC236}">
-                <a16:creationId xmlns:a16="http://schemas.microsoft.com/office/drawing/2014/main" xmlns="" id="{DA3B82F8-7F36-4AE6-A785-76BCA479C67E}"/>
+                <a16:creationId xmlns:a16="http://schemas.microsoft.com/office/drawing/2014/main" id="{DA3B82F8-7F36-4AE6-A785-76BCA479C67E}"/>
               </a:ext>
             </a:extLst>
           </p:cNvPr>
@@ -10434,7 +10510,7 @@
           <p:cNvPr id="9" name="Picture 9" descr="Graphical user interface, text&#10;&#10;Description automatically generated">
             <a:extLst>
               <a:ext uri="{FF2B5EF4-FFF2-40B4-BE49-F238E27FC236}">
-                <a16:creationId xmlns:a16="http://schemas.microsoft.com/office/drawing/2014/main" xmlns="" id="{234C66F9-3C13-47C4-BB7D-CB03218D3AAA}"/>
+                <a16:creationId xmlns:a16="http://schemas.microsoft.com/office/drawing/2014/main" id="{234C66F9-3C13-47C4-BB7D-CB03218D3AAA}"/>
               </a:ext>
             </a:extLst>
           </p:cNvPr>
@@ -10463,7 +10539,7 @@
           <p:cNvPr id="10" name="Picture 11" descr="Chart&#10;&#10;Description automatically generated">
             <a:extLst>
               <a:ext uri="{FF2B5EF4-FFF2-40B4-BE49-F238E27FC236}">
-                <a16:creationId xmlns:a16="http://schemas.microsoft.com/office/drawing/2014/main" xmlns="" id="{330C27DF-9A2B-4142-B86D-A8C280ECE056}"/>
+                <a16:creationId xmlns:a16="http://schemas.microsoft.com/office/drawing/2014/main" id="{330C27DF-9A2B-4142-B86D-A8C280ECE056}"/>
               </a:ext>
             </a:extLst>
           </p:cNvPr>

</xml_diff>